<commit_message>
Conteudo inicial do curso
</commit_message>
<xml_diff>
--- a/Angular.pptx
+++ b/Angular.pptx
@@ -11,12 +11,15 @@
     <p:sldId id="265" r:id="rId5"/>
     <p:sldId id="266" r:id="rId6"/>
     <p:sldId id="267" r:id="rId7"/>
-    <p:sldId id="257" r:id="rId8"/>
-    <p:sldId id="258" r:id="rId9"/>
-    <p:sldId id="260" r:id="rId10"/>
-    <p:sldId id="259" r:id="rId11"/>
-    <p:sldId id="261" r:id="rId12"/>
-    <p:sldId id="262" r:id="rId13"/>
+    <p:sldId id="268" r:id="rId8"/>
+    <p:sldId id="269" r:id="rId9"/>
+    <p:sldId id="270" r:id="rId10"/>
+    <p:sldId id="257" r:id="rId11"/>
+    <p:sldId id="258" r:id="rId12"/>
+    <p:sldId id="260" r:id="rId13"/>
+    <p:sldId id="259" r:id="rId14"/>
+    <p:sldId id="261" r:id="rId15"/>
+    <p:sldId id="262" r:id="rId16"/>
   </p:sldIdLst>
   <p:sldSz cx="12192000" cy="6858000"/>
   <p:notesSz cx="6858000" cy="9144000"/>
@@ -3079,7 +3082,134 @@
             </a:r>
             <a:r>
               <a:rPr lang="pt-BR" dirty="0" smtClean="0"/>
-              <a:t> 4:</a:t>
+              <a:t> 1: </a:t>
+            </a:r>
+            <a:r>
+              <a:rPr lang="pt-BR" dirty="0" err="1" smtClean="0"/>
+              <a:t>Getting</a:t>
+            </a:r>
+            <a:r>
+              <a:rPr lang="pt-BR" dirty="0" smtClean="0"/>
+              <a:t> </a:t>
+            </a:r>
+            <a:r>
+              <a:rPr lang="pt-BR" dirty="0" err="1" smtClean="0"/>
+              <a:t>started</a:t>
+            </a:r>
+            <a:endParaRPr lang="pt-BR" dirty="0"/>
+          </a:p>
+        </p:txBody>
+      </p:sp>
+      <p:sp>
+        <p:nvSpPr>
+          <p:cNvPr id="3" name="Espaço Reservado para Conteúdo 2"/>
+          <p:cNvSpPr>
+            <a:spLocks noGrp="1"/>
+          </p:cNvSpPr>
+          <p:nvPr>
+            <p:ph sz="half" idx="1"/>
+          </p:nvPr>
+        </p:nvSpPr>
+        <p:spPr/>
+        <p:txBody>
+          <a:bodyPr>
+            <a:normAutofit fontScale="77500" lnSpcReduction="20000"/>
+          </a:bodyPr>
+          <a:lstStyle/>
+          <a:p>
+            <a:r>
+              <a:rPr lang="pt-BR" dirty="0" err="1" smtClean="0"/>
+              <a:t>What</a:t>
+            </a:r>
+            <a:r>
+              <a:rPr lang="pt-BR" dirty="0" smtClean="0"/>
+              <a:t> </a:t>
+            </a:r>
+            <a:r>
+              <a:rPr lang="pt-BR" dirty="0" err="1" smtClean="0"/>
+              <a:t>you</a:t>
+            </a:r>
+            <a:r>
+              <a:rPr lang="pt-BR" dirty="0" smtClean="0"/>
+              <a:t> </a:t>
+            </a:r>
+            <a:r>
+              <a:rPr lang="pt-BR" dirty="0" err="1" smtClean="0"/>
+              <a:t>need</a:t>
+            </a:r>
+            <a:r>
+              <a:rPr lang="pt-BR" dirty="0" smtClean="0"/>
+              <a:t> </a:t>
+            </a:r>
+            <a:r>
+              <a:rPr lang="pt-BR" dirty="0" err="1" smtClean="0"/>
+              <a:t>to</a:t>
+            </a:r>
+            <a:r>
+              <a:rPr lang="pt-BR" dirty="0" smtClean="0"/>
+              <a:t> </a:t>
+            </a:r>
+            <a:r>
+              <a:rPr lang="pt-BR" dirty="0" err="1" smtClean="0"/>
+              <a:t>know</a:t>
+            </a:r>
+            <a:endParaRPr lang="pt-BR" dirty="0" smtClean="0"/>
+          </a:p>
+          <a:p>
+            <a:r>
+              <a:rPr lang="pt-BR" dirty="0" err="1" smtClean="0"/>
+              <a:t>Why</a:t>
+            </a:r>
+            <a:r>
+              <a:rPr lang="pt-BR" dirty="0" smtClean="0"/>
+              <a:t> Angular?</a:t>
+            </a:r>
+          </a:p>
+          <a:p>
+            <a:r>
+              <a:rPr lang="pt-BR" dirty="0" err="1" smtClean="0"/>
+              <a:t>Traditional</a:t>
+            </a:r>
+            <a:r>
+              <a:rPr lang="pt-BR" dirty="0" smtClean="0"/>
+              <a:t> Page-</a:t>
+            </a:r>
+            <a:r>
+              <a:rPr lang="pt-BR" dirty="0" err="1" smtClean="0"/>
+              <a:t>refresh</a:t>
+            </a:r>
+            <a:endParaRPr lang="pt-BR" dirty="0" smtClean="0"/>
+          </a:p>
+          <a:p>
+            <a:r>
+              <a:rPr lang="pt-BR" dirty="0" err="1" smtClean="0"/>
+              <a:t>Responsive</a:t>
+            </a:r>
+            <a:r>
+              <a:rPr lang="pt-BR" baseline="0" dirty="0" smtClean="0"/>
+              <a:t> website </a:t>
+            </a:r>
+            <a:r>
+              <a:rPr lang="pt-BR" baseline="0" dirty="0" err="1" smtClean="0"/>
+              <a:t>using</a:t>
+            </a:r>
+            <a:r>
+              <a:rPr lang="pt-BR" baseline="0" dirty="0" smtClean="0"/>
+              <a:t> Angular</a:t>
+            </a:r>
+          </a:p>
+          <a:p>
+            <a:r>
+              <a:rPr lang="pt-BR" baseline="0" dirty="0" err="1" smtClean="0"/>
+              <a:t>Modern</a:t>
+            </a:r>
+            <a:r>
+              <a:rPr lang="pt-BR" baseline="0" dirty="0" smtClean="0"/>
+              <a:t> API-</a:t>
+            </a:r>
+            <a:r>
+              <a:rPr lang="pt-BR" baseline="0" dirty="0" err="1" smtClean="0"/>
+              <a:t>Driven</a:t>
             </a:r>
             <a:r>
               <a:rPr lang="pt-BR" baseline="0" dirty="0" smtClean="0"/>
@@ -3087,42 +3217,14 @@
             </a:r>
             <a:r>
               <a:rPr lang="pt-BR" baseline="0" dirty="0" err="1" smtClean="0"/>
-              <a:t>Creating</a:t>
-            </a:r>
-            <a:r>
-              <a:rPr lang="pt-BR" baseline="0" dirty="0" smtClean="0"/>
-              <a:t> a </a:t>
-            </a:r>
+              <a:t>Application</a:t>
+            </a:r>
+            <a:endParaRPr lang="pt-BR" baseline="0" dirty="0" smtClean="0"/>
+          </a:p>
+          <a:p>
             <a:r>
               <a:rPr lang="pt-BR" baseline="0" dirty="0" err="1" smtClean="0"/>
-              <a:t>Directive</a:t>
-            </a:r>
-            <a:endParaRPr lang="pt-BR" dirty="0"/>
-          </a:p>
-        </p:txBody>
-      </p:sp>
-      <p:sp>
-        <p:nvSpPr>
-          <p:cNvPr id="3" name="Espaço Reservado para Conteúdo 2"/>
-          <p:cNvSpPr>
-            <a:spLocks noGrp="1"/>
-          </p:cNvSpPr>
-          <p:nvPr>
-            <p:ph idx="1"/>
-          </p:nvPr>
-        </p:nvSpPr>
-        <p:spPr/>
-        <p:txBody>
-          <a:bodyPr/>
-          <a:lstStyle/>
-          <a:p>
-            <a:r>
-              <a:rPr lang="pt-BR" dirty="0" err="1" smtClean="0"/>
-              <a:t>ng</a:t>
-            </a:r>
-            <a:r>
-              <a:rPr lang="pt-BR" dirty="0" smtClean="0"/>
-              <a:t>-include</a:t>
+              <a:t>What</a:t>
             </a:r>
             <a:r>
               <a:rPr lang="pt-BR" baseline="0" dirty="0" smtClean="0"/>
@@ -3130,18 +3232,158 @@
             </a:r>
             <a:r>
               <a:rPr lang="pt-BR" baseline="0" dirty="0" err="1" smtClean="0"/>
+              <a:t>is</a:t>
+            </a:r>
+            <a:r>
+              <a:rPr lang="pt-BR" baseline="0" dirty="0" smtClean="0"/>
+              <a:t> Angular JS?</a:t>
+            </a:r>
+          </a:p>
+          <a:p>
+            <a:r>
+              <a:rPr lang="pt-BR" baseline="0" dirty="0" err="1" smtClean="0"/>
+              <a:t>Directives</a:t>
+            </a:r>
+            <a:endParaRPr lang="pt-BR" baseline="0" dirty="0" smtClean="0"/>
+          </a:p>
+          <a:p>
+            <a:r>
+              <a:rPr lang="pt-BR" baseline="0" dirty="0" err="1" smtClean="0"/>
+              <a:t>Downloading</a:t>
+            </a:r>
+            <a:endParaRPr lang="pt-BR" baseline="0" dirty="0" smtClean="0"/>
+          </a:p>
+          <a:p>
+            <a:r>
+              <a:rPr lang="pt-BR" baseline="0" dirty="0" smtClean="0"/>
+              <a:t>Modules</a:t>
+            </a:r>
+          </a:p>
+          <a:p>
+            <a:r>
+              <a:rPr lang="pt-BR" baseline="0" dirty="0" err="1" smtClean="0"/>
+              <a:t>Expressions</a:t>
+            </a:r>
+            <a:endParaRPr lang="pt-BR" baseline="0" dirty="0" smtClean="0"/>
+          </a:p>
+          <a:p>
+            <a:r>
+              <a:rPr lang="pt-BR" baseline="0" dirty="0" err="1" smtClean="0"/>
+              <a:t>Working</a:t>
+            </a:r>
+            <a:r>
+              <a:rPr lang="pt-BR" baseline="0" dirty="0" smtClean="0"/>
+              <a:t> </a:t>
+            </a:r>
+            <a:r>
+              <a:rPr lang="pt-BR" baseline="0" dirty="0" err="1" smtClean="0"/>
+              <a:t>with</a:t>
+            </a:r>
+            <a:r>
+              <a:rPr lang="pt-BR" baseline="0" dirty="0" smtClean="0"/>
+              <a:t> Data</a:t>
+            </a:r>
+          </a:p>
+          <a:p>
+            <a:r>
+              <a:rPr lang="pt-BR" dirty="0" err="1" smtClean="0"/>
+              <a:t>Controllers</a:t>
+            </a:r>
+            <a:endParaRPr lang="pt-BR" dirty="0" smtClean="0"/>
+          </a:p>
+        </p:txBody>
+      </p:sp>
+      <p:sp>
+        <p:nvSpPr>
+          <p:cNvPr id="4" name="Espaço Reservado para Conteúdo 3"/>
+          <p:cNvSpPr>
+            <a:spLocks noGrp="1"/>
+          </p:cNvSpPr>
+          <p:nvPr>
+            <p:ph sz="half" idx="2"/>
+          </p:nvPr>
+        </p:nvSpPr>
+        <p:spPr/>
+        <p:txBody>
+          <a:bodyPr>
+            <a:normAutofit fontScale="77500" lnSpcReduction="20000"/>
+          </a:bodyPr>
+          <a:lstStyle/>
+          <a:p>
+            <a:r>
+              <a:rPr lang="pt-BR" dirty="0" err="1" smtClean="0"/>
+              <a:t>Views</a:t>
+            </a:r>
+            <a:endParaRPr lang="pt-BR" dirty="0" smtClean="0"/>
+          </a:p>
+          <a:p>
+            <a:r>
+              <a:rPr lang="pt-BR" dirty="0" err="1" smtClean="0"/>
+              <a:t>Scope</a:t>
+            </a:r>
+            <a:endParaRPr lang="pt-BR" dirty="0" smtClean="0"/>
+          </a:p>
+          <a:p>
+            <a:r>
+              <a:rPr lang="pt-BR" dirty="0" err="1" smtClean="0"/>
+              <a:t>ng</a:t>
+            </a:r>
+            <a:r>
+              <a:rPr lang="pt-BR" dirty="0" smtClean="0"/>
+              <a:t>-show </a:t>
+            </a:r>
+            <a:r>
+              <a:rPr lang="pt-BR" dirty="0" err="1" smtClean="0"/>
               <a:t>Directive</a:t>
             </a:r>
-            <a:endParaRPr lang="pt-BR" baseline="0" dirty="0" smtClean="0"/>
-          </a:p>
-          <a:p>
+            <a:endParaRPr lang="pt-BR" dirty="0" smtClean="0"/>
+          </a:p>
+          <a:p>
+            <a:r>
+              <a:rPr lang="pt-BR" dirty="0" err="1" smtClean="0"/>
+              <a:t>ng-hide</a:t>
+            </a:r>
+            <a:r>
+              <a:rPr lang="pt-BR" dirty="0" smtClean="0"/>
+              <a:t> </a:t>
+            </a:r>
+            <a:r>
+              <a:rPr lang="pt-BR" dirty="0" err="1" smtClean="0"/>
+              <a:t>Directive</a:t>
+            </a:r>
+            <a:endParaRPr lang="pt-BR" dirty="0" smtClean="0"/>
+          </a:p>
+          <a:p>
+            <a:r>
+              <a:rPr lang="pt-BR" dirty="0" err="1" smtClean="0"/>
+              <a:t>ng-repeat</a:t>
+            </a:r>
+            <a:r>
+              <a:rPr lang="pt-BR" dirty="0" smtClean="0"/>
+              <a:t> </a:t>
+            </a:r>
+            <a:r>
+              <a:rPr lang="pt-BR" dirty="0" err="1" smtClean="0"/>
+              <a:t>Directive</a:t>
+            </a:r>
+            <a:endParaRPr lang="pt-BR" dirty="0" smtClean="0"/>
+          </a:p>
+          <a:p>
+            <a:r>
+              <a:rPr lang="pt-BR" dirty="0" smtClean="0"/>
+              <a:t>*</a:t>
+            </a:r>
+            <a:r>
+              <a:rPr lang="pt-BR" dirty="0" err="1" smtClean="0"/>
+              <a:t>Two-way</a:t>
+            </a:r>
+            <a:r>
+              <a:rPr lang="pt-BR" baseline="0" dirty="0" smtClean="0"/>
+              <a:t> data </a:t>
+            </a:r>
             <a:r>
               <a:rPr lang="pt-BR" baseline="0" dirty="0" err="1" smtClean="0"/>
-              <a:t>app.directive</a:t>
-            </a:r>
-            <a:r>
-              <a:rPr lang="pt-BR" baseline="0" dirty="0" smtClean="0"/>
-              <a:t>()</a:t>
+              <a:t>binding</a:t>
             </a:r>
             <a:endParaRPr lang="pt-BR" dirty="0"/>
           </a:p>
@@ -3150,7 +3392,7 @@
     </p:spTree>
     <p:extLst>
       <p:ext uri="{BB962C8B-B14F-4D97-AF65-F5344CB8AC3E}">
-        <p14:creationId xmlns:p14="http://schemas.microsoft.com/office/powerpoint/2010/main" val="3809308330"/>
+        <p14:creationId xmlns:p14="http://schemas.microsoft.com/office/powerpoint/2010/main" val="4041649749"/>
       </p:ext>
     </p:extLst>
   </p:cSld>
@@ -3205,6 +3447,880 @@
             </a:r>
             <a:r>
               <a:rPr lang="pt-BR" dirty="0" smtClean="0"/>
+              <a:t> 2: </a:t>
+            </a:r>
+            <a:r>
+              <a:rPr lang="pt-BR" dirty="0" err="1" smtClean="0"/>
+              <a:t>Filters</a:t>
+            </a:r>
+            <a:r>
+              <a:rPr lang="pt-BR" dirty="0" smtClean="0"/>
+              <a:t>, </a:t>
+            </a:r>
+            <a:r>
+              <a:rPr lang="pt-BR" dirty="0" err="1" smtClean="0"/>
+              <a:t>Directives</a:t>
+            </a:r>
+            <a:r>
+              <a:rPr lang="pt-BR" dirty="0" smtClean="0"/>
+              <a:t>,</a:t>
+            </a:r>
+            <a:r>
+              <a:rPr lang="pt-BR" baseline="0" dirty="0" smtClean="0"/>
+              <a:t> </a:t>
+            </a:r>
+            <a:r>
+              <a:rPr lang="pt-BR" baseline="0" dirty="0" err="1" smtClean="0"/>
+              <a:t>Cleaner</a:t>
+            </a:r>
+            <a:r>
+              <a:rPr lang="pt-BR" baseline="0" dirty="0" smtClean="0"/>
+              <a:t> </a:t>
+            </a:r>
+            <a:r>
+              <a:rPr lang="pt-BR" baseline="0" dirty="0" err="1" smtClean="0"/>
+              <a:t>Code</a:t>
+            </a:r>
+            <a:endParaRPr lang="pt-BR" dirty="0"/>
+          </a:p>
+        </p:txBody>
+      </p:sp>
+      <p:sp>
+        <p:nvSpPr>
+          <p:cNvPr id="4" name="Espaço Reservado para Conteúdo 3"/>
+          <p:cNvSpPr>
+            <a:spLocks noGrp="1"/>
+          </p:cNvSpPr>
+          <p:nvPr>
+            <p:ph sz="half" idx="1"/>
+          </p:nvPr>
+        </p:nvSpPr>
+        <p:spPr/>
+        <p:txBody>
+          <a:bodyPr>
+            <a:normAutofit/>
+          </a:bodyPr>
+          <a:lstStyle/>
+          <a:p>
+            <a:r>
+              <a:rPr lang="pt-BR" dirty="0" err="1" smtClean="0"/>
+              <a:t>Main</a:t>
+            </a:r>
+            <a:r>
+              <a:rPr lang="pt-BR" dirty="0" smtClean="0"/>
+              <a:t>,</a:t>
+            </a:r>
+            <a:r>
+              <a:rPr lang="pt-BR" baseline="0" dirty="0" smtClean="0"/>
+              <a:t> </a:t>
+            </a:r>
+            <a:r>
+              <a:rPr lang="pt-BR" baseline="0" dirty="0" err="1" smtClean="0"/>
+              <a:t>favorite</a:t>
+            </a:r>
+            <a:r>
+              <a:rPr lang="pt-BR" baseline="0" dirty="0" smtClean="0"/>
+              <a:t> </a:t>
+            </a:r>
+            <a:r>
+              <a:rPr lang="pt-BR" baseline="0" dirty="0" err="1" smtClean="0"/>
+              <a:t>Directives</a:t>
+            </a:r>
+            <a:endParaRPr lang="pt-BR" baseline="0" dirty="0" smtClean="0"/>
+          </a:p>
+          <a:p>
+            <a:pPr lvl="1"/>
+            <a:r>
+              <a:rPr lang="pt-BR" dirty="0" err="1" smtClean="0"/>
+              <a:t>ng-app</a:t>
+            </a:r>
+            <a:endParaRPr lang="pt-BR" dirty="0" smtClean="0"/>
+          </a:p>
+          <a:p>
+            <a:pPr lvl="1"/>
+            <a:r>
+              <a:rPr lang="pt-BR" dirty="0" err="1" smtClean="0"/>
+              <a:t>ng-controller</a:t>
+            </a:r>
+            <a:endParaRPr lang="pt-BR" dirty="0" smtClean="0"/>
+          </a:p>
+          <a:p>
+            <a:r>
+              <a:rPr lang="pt-BR" dirty="0" err="1" smtClean="0"/>
+              <a:t>Filters</a:t>
+            </a:r>
+            <a:endParaRPr lang="pt-BR" dirty="0" smtClean="0"/>
+          </a:p>
+          <a:p>
+            <a:pPr lvl="1"/>
+            <a:r>
+              <a:rPr lang="pt-BR" dirty="0" err="1" smtClean="0"/>
+              <a:t>currency</a:t>
+            </a:r>
+            <a:endParaRPr lang="pt-BR" dirty="0" smtClean="0"/>
+          </a:p>
+          <a:p>
+            <a:pPr lvl="1"/>
+            <a:r>
+              <a:rPr lang="pt-BR" dirty="0" smtClean="0"/>
+              <a:t>date</a:t>
+            </a:r>
+          </a:p>
+          <a:p>
+            <a:pPr lvl="1"/>
+            <a:r>
+              <a:rPr lang="pt-BR" dirty="0" err="1" smtClean="0"/>
+              <a:t>uppercase</a:t>
+            </a:r>
+            <a:r>
+              <a:rPr lang="pt-BR" dirty="0" smtClean="0"/>
+              <a:t> </a:t>
+            </a:r>
+          </a:p>
+          <a:p>
+            <a:pPr lvl="1"/>
+            <a:r>
+              <a:rPr lang="pt-BR" dirty="0" err="1" smtClean="0"/>
+              <a:t>limitTo</a:t>
+            </a:r>
+            <a:r>
+              <a:rPr lang="pt-BR" dirty="0" smtClean="0"/>
+              <a:t> </a:t>
+            </a:r>
+          </a:p>
+          <a:p>
+            <a:pPr lvl="1"/>
+            <a:r>
+              <a:rPr lang="pt-BR" dirty="0" err="1" smtClean="0"/>
+              <a:t>orderBy</a:t>
+            </a:r>
+            <a:r>
+              <a:rPr lang="pt-BR" dirty="0" smtClean="0"/>
+              <a:t> </a:t>
+            </a:r>
+            <a:endParaRPr lang="pt-BR" dirty="0"/>
+          </a:p>
+        </p:txBody>
+      </p:sp>
+      <p:sp>
+        <p:nvSpPr>
+          <p:cNvPr id="5" name="Espaço Reservado para Conteúdo 4"/>
+          <p:cNvSpPr>
+            <a:spLocks noGrp="1"/>
+          </p:cNvSpPr>
+          <p:nvPr>
+            <p:ph sz="half" idx="2"/>
+          </p:nvPr>
+        </p:nvSpPr>
+        <p:spPr/>
+        <p:txBody>
+          <a:bodyPr>
+            <a:normAutofit/>
+          </a:bodyPr>
+          <a:lstStyle/>
+          <a:p>
+            <a:pPr rtl="0" eaLnBrk="1" latinLnBrk="0" hangingPunct="1"/>
+            <a:r>
+              <a:rPr lang="pt-BR" sz="2800" kern="1200" dirty="0" err="1" smtClean="0">
+                <a:solidFill>
+                  <a:schemeClr val="tx1"/>
+                </a:solidFill>
+                <a:effectLst/>
+                <a:latin typeface="+mn-lt"/>
+                <a:ea typeface="+mn-ea"/>
+                <a:cs typeface="+mn-cs"/>
+              </a:rPr>
+              <a:t>ng-src</a:t>
+            </a:r>
+            <a:r>
+              <a:rPr lang="pt-BR" sz="2800" kern="1200" dirty="0" smtClean="0">
+                <a:solidFill>
+                  <a:schemeClr val="tx1"/>
+                </a:solidFill>
+                <a:effectLst/>
+                <a:latin typeface="+mn-lt"/>
+                <a:ea typeface="+mn-ea"/>
+                <a:cs typeface="+mn-cs"/>
+              </a:rPr>
+              <a:t> </a:t>
+            </a:r>
+            <a:r>
+              <a:rPr lang="pt-BR" sz="2800" kern="1200" dirty="0" err="1" smtClean="0">
+                <a:solidFill>
+                  <a:schemeClr val="tx1"/>
+                </a:solidFill>
+                <a:effectLst/>
+                <a:latin typeface="+mn-lt"/>
+                <a:ea typeface="+mn-ea"/>
+                <a:cs typeface="+mn-cs"/>
+              </a:rPr>
+              <a:t>Directive</a:t>
+            </a:r>
+            <a:endParaRPr lang="pt-BR" sz="2800" dirty="0" smtClean="0">
+              <a:effectLst/>
+            </a:endParaRPr>
+          </a:p>
+          <a:p>
+            <a:pPr rtl="0" eaLnBrk="1" latinLnBrk="0" hangingPunct="1"/>
+            <a:r>
+              <a:rPr lang="pt-BR" sz="2800" kern="1200" dirty="0" err="1" smtClean="0">
+                <a:solidFill>
+                  <a:schemeClr val="tx1"/>
+                </a:solidFill>
+                <a:effectLst/>
+                <a:latin typeface="+mn-lt"/>
+                <a:ea typeface="+mn-ea"/>
+                <a:cs typeface="+mn-cs"/>
+              </a:rPr>
+              <a:t>ng</a:t>
+            </a:r>
+            <a:r>
+              <a:rPr lang="pt-BR" sz="2800" kern="1200" dirty="0" smtClean="0">
+                <a:solidFill>
+                  <a:schemeClr val="tx1"/>
+                </a:solidFill>
+                <a:effectLst/>
+                <a:latin typeface="+mn-lt"/>
+                <a:ea typeface="+mn-ea"/>
+                <a:cs typeface="+mn-cs"/>
+              </a:rPr>
+              <a:t>-click </a:t>
+            </a:r>
+            <a:r>
+              <a:rPr lang="pt-BR" sz="2800" kern="1200" dirty="0" err="1" smtClean="0">
+                <a:solidFill>
+                  <a:schemeClr val="tx1"/>
+                </a:solidFill>
+                <a:effectLst/>
+                <a:latin typeface="+mn-lt"/>
+                <a:ea typeface="+mn-ea"/>
+                <a:cs typeface="+mn-cs"/>
+              </a:rPr>
+              <a:t>Directive</a:t>
+            </a:r>
+            <a:endParaRPr lang="pt-BR" dirty="0" smtClean="0">
+              <a:effectLst/>
+            </a:endParaRPr>
+          </a:p>
+          <a:p>
+            <a:pPr rtl="0" eaLnBrk="1" latinLnBrk="0" hangingPunct="1"/>
+            <a:r>
+              <a:rPr lang="pt-BR" sz="2800" kern="1200" dirty="0" err="1" smtClean="0">
+                <a:solidFill>
+                  <a:schemeClr val="tx1"/>
+                </a:solidFill>
+                <a:effectLst/>
+                <a:latin typeface="+mn-lt"/>
+                <a:ea typeface="+mn-ea"/>
+                <a:cs typeface="+mn-cs"/>
+              </a:rPr>
+              <a:t>ng-init</a:t>
+            </a:r>
+            <a:r>
+              <a:rPr lang="pt-BR" sz="2800" kern="1200" dirty="0" smtClean="0">
+                <a:solidFill>
+                  <a:schemeClr val="tx1"/>
+                </a:solidFill>
+                <a:effectLst/>
+                <a:latin typeface="+mn-lt"/>
+                <a:ea typeface="+mn-ea"/>
+                <a:cs typeface="+mn-cs"/>
+              </a:rPr>
+              <a:t> </a:t>
+            </a:r>
+            <a:r>
+              <a:rPr lang="pt-BR" sz="2800" kern="1200" dirty="0" err="1" smtClean="0">
+                <a:solidFill>
+                  <a:schemeClr val="tx1"/>
+                </a:solidFill>
+                <a:effectLst/>
+                <a:latin typeface="+mn-lt"/>
+                <a:ea typeface="+mn-ea"/>
+                <a:cs typeface="+mn-cs"/>
+              </a:rPr>
+              <a:t>Directive</a:t>
+            </a:r>
+            <a:endParaRPr lang="pt-BR" dirty="0" smtClean="0">
+              <a:effectLst/>
+            </a:endParaRPr>
+          </a:p>
+          <a:p>
+            <a:pPr rtl="0" eaLnBrk="1" latinLnBrk="0" hangingPunct="1"/>
+            <a:r>
+              <a:rPr lang="pt-BR" sz="2800" kern="1200" dirty="0" err="1" smtClean="0">
+                <a:solidFill>
+                  <a:schemeClr val="tx1"/>
+                </a:solidFill>
+                <a:effectLst/>
+                <a:latin typeface="+mn-lt"/>
+                <a:ea typeface="+mn-ea"/>
+                <a:cs typeface="+mn-cs"/>
+              </a:rPr>
+              <a:t>ng-class</a:t>
+            </a:r>
+            <a:r>
+              <a:rPr lang="pt-BR" sz="2800" kern="1200" dirty="0" smtClean="0">
+                <a:solidFill>
+                  <a:schemeClr val="tx1"/>
+                </a:solidFill>
+                <a:effectLst/>
+                <a:latin typeface="+mn-lt"/>
+                <a:ea typeface="+mn-ea"/>
+                <a:cs typeface="+mn-cs"/>
+              </a:rPr>
+              <a:t> </a:t>
+            </a:r>
+            <a:r>
+              <a:rPr lang="pt-BR" sz="2800" kern="1200" dirty="0" err="1" smtClean="0">
+                <a:solidFill>
+                  <a:schemeClr val="tx1"/>
+                </a:solidFill>
+                <a:effectLst/>
+                <a:latin typeface="+mn-lt"/>
+                <a:ea typeface="+mn-ea"/>
+                <a:cs typeface="+mn-cs"/>
+              </a:rPr>
+              <a:t>Directive</a:t>
+            </a:r>
+            <a:endParaRPr lang="pt-BR" dirty="0" smtClean="0">
+              <a:effectLst/>
+            </a:endParaRPr>
+          </a:p>
+          <a:p>
+            <a:pPr rtl="0" eaLnBrk="1" latinLnBrk="0" hangingPunct="1"/>
+            <a:r>
+              <a:rPr lang="pt-BR" sz="2800" kern="1200" dirty="0" err="1" smtClean="0">
+                <a:solidFill>
+                  <a:schemeClr val="tx1"/>
+                </a:solidFill>
+                <a:effectLst/>
+                <a:latin typeface="+mn-lt"/>
+                <a:ea typeface="+mn-ea"/>
+                <a:cs typeface="+mn-cs"/>
+              </a:rPr>
+              <a:t>Cleaning</a:t>
+            </a:r>
+            <a:r>
+              <a:rPr lang="pt-BR" sz="2800" kern="1200" dirty="0" smtClean="0">
+                <a:solidFill>
+                  <a:schemeClr val="tx1"/>
+                </a:solidFill>
+                <a:effectLst/>
+                <a:latin typeface="+mn-lt"/>
+                <a:ea typeface="+mn-ea"/>
+                <a:cs typeface="+mn-cs"/>
+              </a:rPr>
+              <a:t> </a:t>
+            </a:r>
+            <a:r>
+              <a:rPr lang="pt-BR" sz="2800" kern="1200" dirty="0" err="1" smtClean="0">
+                <a:solidFill>
+                  <a:schemeClr val="tx1"/>
+                </a:solidFill>
+                <a:effectLst/>
+                <a:latin typeface="+mn-lt"/>
+                <a:ea typeface="+mn-ea"/>
+                <a:cs typeface="+mn-cs"/>
+              </a:rPr>
+              <a:t>code</a:t>
+            </a:r>
+            <a:r>
+              <a:rPr lang="pt-BR" sz="2800" kern="1200" dirty="0" smtClean="0">
+                <a:solidFill>
+                  <a:schemeClr val="tx1"/>
+                </a:solidFill>
+                <a:effectLst/>
+                <a:latin typeface="+mn-lt"/>
+                <a:ea typeface="+mn-ea"/>
+                <a:cs typeface="+mn-cs"/>
+              </a:rPr>
+              <a:t>: </a:t>
+            </a:r>
+            <a:r>
+              <a:rPr lang="pt-BR" sz="2800" kern="1200" dirty="0" err="1" smtClean="0">
+                <a:solidFill>
+                  <a:schemeClr val="tx1"/>
+                </a:solidFill>
+                <a:effectLst/>
+                <a:latin typeface="+mn-lt"/>
+                <a:ea typeface="+mn-ea"/>
+                <a:cs typeface="+mn-cs"/>
+              </a:rPr>
+              <a:t>moving</a:t>
+            </a:r>
+            <a:r>
+              <a:rPr lang="pt-BR" sz="2800" kern="1200" dirty="0" smtClean="0">
+                <a:solidFill>
+                  <a:schemeClr val="tx1"/>
+                </a:solidFill>
+                <a:effectLst/>
+                <a:latin typeface="+mn-lt"/>
+                <a:ea typeface="+mn-ea"/>
+                <a:cs typeface="+mn-cs"/>
+              </a:rPr>
+              <a:t> </a:t>
+            </a:r>
+            <a:r>
+              <a:rPr lang="pt-BR" sz="2800" kern="1200" dirty="0" err="1" smtClean="0">
+                <a:solidFill>
+                  <a:schemeClr val="tx1"/>
+                </a:solidFill>
+                <a:effectLst/>
+                <a:latin typeface="+mn-lt"/>
+                <a:ea typeface="+mn-ea"/>
+                <a:cs typeface="+mn-cs"/>
+              </a:rPr>
+              <a:t>code</a:t>
+            </a:r>
+            <a:r>
+              <a:rPr lang="pt-BR" sz="2800" kern="1200" dirty="0" smtClean="0">
+                <a:solidFill>
+                  <a:schemeClr val="tx1"/>
+                </a:solidFill>
+                <a:effectLst/>
+                <a:latin typeface="+mn-lt"/>
+                <a:ea typeface="+mn-ea"/>
+                <a:cs typeface="+mn-cs"/>
+              </a:rPr>
+              <a:t> </a:t>
+            </a:r>
+            <a:r>
+              <a:rPr lang="pt-BR" sz="2800" kern="1200" dirty="0" err="1" smtClean="0">
+                <a:solidFill>
+                  <a:schemeClr val="tx1"/>
+                </a:solidFill>
+                <a:effectLst/>
+                <a:latin typeface="+mn-lt"/>
+                <a:ea typeface="+mn-ea"/>
+                <a:cs typeface="+mn-cs"/>
+              </a:rPr>
+              <a:t>from</a:t>
+            </a:r>
+            <a:r>
+              <a:rPr lang="pt-BR" sz="2800" kern="1200" dirty="0" smtClean="0">
+                <a:solidFill>
+                  <a:schemeClr val="tx1"/>
+                </a:solidFill>
+                <a:effectLst/>
+                <a:latin typeface="+mn-lt"/>
+                <a:ea typeface="+mn-ea"/>
+                <a:cs typeface="+mn-cs"/>
+              </a:rPr>
+              <a:t> </a:t>
+            </a:r>
+            <a:r>
+              <a:rPr lang="pt-BR" sz="2800" kern="1200" dirty="0" err="1" smtClean="0">
+                <a:solidFill>
+                  <a:schemeClr val="tx1"/>
+                </a:solidFill>
+                <a:effectLst/>
+                <a:latin typeface="+mn-lt"/>
+                <a:ea typeface="+mn-ea"/>
+                <a:cs typeface="+mn-cs"/>
+              </a:rPr>
+              <a:t>view</a:t>
+            </a:r>
+            <a:r>
+              <a:rPr lang="pt-BR" sz="2800" kern="1200" dirty="0" smtClean="0">
+                <a:solidFill>
+                  <a:schemeClr val="tx1"/>
+                </a:solidFill>
+                <a:effectLst/>
+                <a:latin typeface="+mn-lt"/>
+                <a:ea typeface="+mn-ea"/>
+                <a:cs typeface="+mn-cs"/>
+              </a:rPr>
+              <a:t> </a:t>
+            </a:r>
+            <a:r>
+              <a:rPr lang="pt-BR" sz="2800" kern="1200" dirty="0" err="1" smtClean="0">
+                <a:solidFill>
+                  <a:schemeClr val="tx1"/>
+                </a:solidFill>
+                <a:effectLst/>
+                <a:latin typeface="+mn-lt"/>
+                <a:ea typeface="+mn-ea"/>
+                <a:cs typeface="+mn-cs"/>
+              </a:rPr>
+              <a:t>to</a:t>
+            </a:r>
+            <a:r>
+              <a:rPr lang="pt-BR" sz="2800" kern="1200" dirty="0" smtClean="0">
+                <a:solidFill>
+                  <a:schemeClr val="tx1"/>
+                </a:solidFill>
+                <a:effectLst/>
+                <a:latin typeface="+mn-lt"/>
+                <a:ea typeface="+mn-ea"/>
+                <a:cs typeface="+mn-cs"/>
+              </a:rPr>
+              <a:t> </a:t>
+            </a:r>
+            <a:r>
+              <a:rPr lang="pt-BR" sz="2800" kern="1200" dirty="0" err="1" smtClean="0">
+                <a:solidFill>
+                  <a:schemeClr val="tx1"/>
+                </a:solidFill>
+                <a:effectLst/>
+                <a:latin typeface="+mn-lt"/>
+                <a:ea typeface="+mn-ea"/>
+                <a:cs typeface="+mn-cs"/>
+              </a:rPr>
+              <a:t>controller</a:t>
+            </a:r>
+            <a:endParaRPr lang="pt-BR" dirty="0" smtClean="0">
+              <a:effectLst/>
+            </a:endParaRPr>
+          </a:p>
+        </p:txBody>
+      </p:sp>
+    </p:spTree>
+    <p:extLst>
+      <p:ext uri="{BB962C8B-B14F-4D97-AF65-F5344CB8AC3E}">
+        <p14:creationId xmlns:p14="http://schemas.microsoft.com/office/powerpoint/2010/main" val="4147979107"/>
+      </p:ext>
+    </p:extLst>
+  </p:cSld>
+  <p:clrMapOvr>
+    <a:masterClrMapping/>
+  </p:clrMapOvr>
+  <p:timing>
+    <p:tnLst>
+      <p:par>
+        <p:cTn id="1" dur="indefinite" restart="never" nodeType="tmRoot"/>
+      </p:par>
+    </p:tnLst>
+  </p:timing>
+</p:sld>
+</file>
+
+<file path=ppt/slides/slide12.xml><?xml version="1.0" encoding="utf-8"?>
+<p:sld xmlns:a="http://schemas.openxmlformats.org/drawingml/2006/main" xmlns:r="http://schemas.openxmlformats.org/officeDocument/2006/relationships" xmlns:p="http://schemas.openxmlformats.org/presentationml/2006/main">
+  <p:cSld>
+    <p:spTree>
+      <p:nvGrpSpPr>
+        <p:cNvPr id="1" name=""/>
+        <p:cNvGrpSpPr/>
+        <p:nvPr/>
+      </p:nvGrpSpPr>
+      <p:grpSpPr>
+        <a:xfrm>
+          <a:off x="0" y="0"/>
+          <a:ext cx="0" cy="0"/>
+          <a:chOff x="0" y="0"/>
+          <a:chExt cx="0" cy="0"/>
+        </a:xfrm>
+      </p:grpSpPr>
+      <p:sp>
+        <p:nvSpPr>
+          <p:cNvPr id="4" name="Título 3"/>
+          <p:cNvSpPr>
+            <a:spLocks noGrp="1"/>
+          </p:cNvSpPr>
+          <p:nvPr>
+            <p:ph type="title"/>
+          </p:nvPr>
+        </p:nvSpPr>
+        <p:spPr/>
+        <p:txBody>
+          <a:bodyPr/>
+          <a:lstStyle/>
+          <a:p>
+            <a:r>
+              <a:rPr lang="pt-BR" dirty="0" err="1" smtClean="0"/>
+              <a:t>Level</a:t>
+            </a:r>
+            <a:r>
+              <a:rPr lang="pt-BR" dirty="0" smtClean="0"/>
+              <a:t> 3: </a:t>
+            </a:r>
+            <a:r>
+              <a:rPr lang="pt-BR" dirty="0" err="1" smtClean="0"/>
+              <a:t>Forms</a:t>
+            </a:r>
+            <a:r>
+              <a:rPr lang="pt-BR" dirty="0" smtClean="0"/>
+              <a:t>, </a:t>
+            </a:r>
+            <a:r>
+              <a:rPr lang="pt-BR" dirty="0" err="1" smtClean="0"/>
+              <a:t>Models</a:t>
+            </a:r>
+            <a:r>
+              <a:rPr lang="pt-BR" dirty="0" smtClean="0"/>
+              <a:t>, </a:t>
+            </a:r>
+            <a:r>
+              <a:rPr lang="pt-BR" dirty="0" err="1" smtClean="0"/>
+              <a:t>Validations</a:t>
+            </a:r>
+            <a:endParaRPr lang="pt-BR" dirty="0"/>
+          </a:p>
+        </p:txBody>
+      </p:sp>
+      <p:sp>
+        <p:nvSpPr>
+          <p:cNvPr id="5" name="Espaço Reservado para Conteúdo 4"/>
+          <p:cNvSpPr>
+            <a:spLocks noGrp="1"/>
+          </p:cNvSpPr>
+          <p:nvPr>
+            <p:ph sz="half" idx="1"/>
+          </p:nvPr>
+        </p:nvSpPr>
+        <p:spPr/>
+        <p:txBody>
+          <a:bodyPr/>
+          <a:lstStyle/>
+          <a:p>
+            <a:r>
+              <a:rPr lang="pt-BR" dirty="0" err="1" smtClean="0"/>
+              <a:t>ng-model</a:t>
+            </a:r>
+            <a:r>
+              <a:rPr lang="pt-BR" dirty="0" smtClean="0"/>
+              <a:t> </a:t>
+            </a:r>
+            <a:r>
+              <a:rPr lang="pt-BR" dirty="0" err="1" smtClean="0"/>
+              <a:t>Directive</a:t>
+            </a:r>
+            <a:endParaRPr lang="pt-BR" dirty="0" smtClean="0"/>
+          </a:p>
+          <a:p>
+            <a:r>
+              <a:rPr lang="pt-BR" dirty="0" err="1" smtClean="0"/>
+              <a:t>ng-submit</a:t>
+            </a:r>
+            <a:r>
+              <a:rPr lang="pt-BR" dirty="0" smtClean="0"/>
+              <a:t> </a:t>
+            </a:r>
+            <a:r>
+              <a:rPr lang="pt-BR" dirty="0" err="1" smtClean="0"/>
+              <a:t>Directive</a:t>
+            </a:r>
+            <a:endParaRPr lang="pt-BR" dirty="0" smtClean="0"/>
+          </a:p>
+          <a:p>
+            <a:r>
+              <a:rPr lang="pt-BR" dirty="0" smtClean="0"/>
+              <a:t>$</a:t>
+            </a:r>
+            <a:r>
+              <a:rPr lang="pt-BR" dirty="0" err="1" smtClean="0"/>
+              <a:t>valid</a:t>
+            </a:r>
+            <a:endParaRPr lang="pt-BR" dirty="0"/>
+          </a:p>
+        </p:txBody>
+      </p:sp>
+      <p:sp>
+        <p:nvSpPr>
+          <p:cNvPr id="6" name="Espaço Reservado para Conteúdo 5"/>
+          <p:cNvSpPr>
+            <a:spLocks noGrp="1"/>
+          </p:cNvSpPr>
+          <p:nvPr>
+            <p:ph sz="half" idx="2"/>
+          </p:nvPr>
+        </p:nvSpPr>
+        <p:spPr/>
+        <p:txBody>
+          <a:bodyPr/>
+          <a:lstStyle/>
+          <a:p>
+            <a:pPr marL="0" indent="0">
+              <a:buNone/>
+            </a:pPr>
+            <a:endParaRPr lang="pt-BR" dirty="0"/>
+          </a:p>
+        </p:txBody>
+      </p:sp>
+    </p:spTree>
+    <p:extLst>
+      <p:ext uri="{BB962C8B-B14F-4D97-AF65-F5344CB8AC3E}">
+        <p14:creationId xmlns:p14="http://schemas.microsoft.com/office/powerpoint/2010/main" val="3933258382"/>
+      </p:ext>
+    </p:extLst>
+  </p:cSld>
+  <p:clrMapOvr>
+    <a:masterClrMapping/>
+  </p:clrMapOvr>
+  <p:timing>
+    <p:tnLst>
+      <p:par>
+        <p:cTn id="1" dur="indefinite" restart="never" nodeType="tmRoot"/>
+      </p:par>
+    </p:tnLst>
+  </p:timing>
+</p:sld>
+</file>
+
+<file path=ppt/slides/slide13.xml><?xml version="1.0" encoding="utf-8"?>
+<p:sld xmlns:a="http://schemas.openxmlformats.org/drawingml/2006/main" xmlns:r="http://schemas.openxmlformats.org/officeDocument/2006/relationships" xmlns:p="http://schemas.openxmlformats.org/presentationml/2006/main">
+  <p:cSld>
+    <p:spTree>
+      <p:nvGrpSpPr>
+        <p:cNvPr id="1" name=""/>
+        <p:cNvGrpSpPr/>
+        <p:nvPr/>
+      </p:nvGrpSpPr>
+      <p:grpSpPr>
+        <a:xfrm>
+          <a:off x="0" y="0"/>
+          <a:ext cx="0" cy="0"/>
+          <a:chOff x="0" y="0"/>
+          <a:chExt cx="0" cy="0"/>
+        </a:xfrm>
+      </p:grpSpPr>
+      <p:sp>
+        <p:nvSpPr>
+          <p:cNvPr id="2" name="Título 1"/>
+          <p:cNvSpPr>
+            <a:spLocks noGrp="1"/>
+          </p:cNvSpPr>
+          <p:nvPr>
+            <p:ph type="title"/>
+          </p:nvPr>
+        </p:nvSpPr>
+        <p:spPr/>
+        <p:txBody>
+          <a:bodyPr/>
+          <a:lstStyle/>
+          <a:p>
+            <a:r>
+              <a:rPr lang="pt-BR" dirty="0" err="1" smtClean="0"/>
+              <a:t>Level</a:t>
+            </a:r>
+            <a:r>
+              <a:rPr lang="pt-BR" dirty="0" smtClean="0"/>
+              <a:t> 4:</a:t>
+            </a:r>
+            <a:r>
+              <a:rPr lang="pt-BR" baseline="0" dirty="0" smtClean="0"/>
+              <a:t> </a:t>
+            </a:r>
+            <a:r>
+              <a:rPr lang="pt-BR" baseline="0" dirty="0" err="1" smtClean="0"/>
+              <a:t>Creating</a:t>
+            </a:r>
+            <a:r>
+              <a:rPr lang="pt-BR" baseline="0" dirty="0" smtClean="0"/>
+              <a:t> a </a:t>
+            </a:r>
+            <a:r>
+              <a:rPr lang="pt-BR" baseline="0" dirty="0" err="1" smtClean="0"/>
+              <a:t>Directive</a:t>
+            </a:r>
+            <a:endParaRPr lang="pt-BR" dirty="0"/>
+          </a:p>
+        </p:txBody>
+      </p:sp>
+      <p:sp>
+        <p:nvSpPr>
+          <p:cNvPr id="3" name="Espaço Reservado para Conteúdo 2"/>
+          <p:cNvSpPr>
+            <a:spLocks noGrp="1"/>
+          </p:cNvSpPr>
+          <p:nvPr>
+            <p:ph idx="1"/>
+          </p:nvPr>
+        </p:nvSpPr>
+        <p:spPr/>
+        <p:txBody>
+          <a:bodyPr/>
+          <a:lstStyle/>
+          <a:p>
+            <a:r>
+              <a:rPr lang="pt-BR" dirty="0" err="1" smtClean="0"/>
+              <a:t>ng</a:t>
+            </a:r>
+            <a:r>
+              <a:rPr lang="pt-BR" dirty="0" smtClean="0"/>
+              <a:t>-include</a:t>
+            </a:r>
+            <a:r>
+              <a:rPr lang="pt-BR" baseline="0" dirty="0" smtClean="0"/>
+              <a:t> </a:t>
+            </a:r>
+            <a:r>
+              <a:rPr lang="pt-BR" baseline="0" dirty="0" err="1" smtClean="0"/>
+              <a:t>Directive</a:t>
+            </a:r>
+            <a:endParaRPr lang="pt-BR" baseline="0" dirty="0" smtClean="0"/>
+          </a:p>
+          <a:p>
+            <a:r>
+              <a:rPr lang="pt-BR" baseline="0" dirty="0" err="1" smtClean="0"/>
+              <a:t>app.directive</a:t>
+            </a:r>
+            <a:r>
+              <a:rPr lang="pt-BR" baseline="0" dirty="0" smtClean="0"/>
+              <a:t>()</a:t>
+            </a:r>
+            <a:endParaRPr lang="pt-BR" dirty="0"/>
+          </a:p>
+        </p:txBody>
+      </p:sp>
+    </p:spTree>
+    <p:extLst>
+      <p:ext uri="{BB962C8B-B14F-4D97-AF65-F5344CB8AC3E}">
+        <p14:creationId xmlns:p14="http://schemas.microsoft.com/office/powerpoint/2010/main" val="3809308330"/>
+      </p:ext>
+    </p:extLst>
+  </p:cSld>
+  <p:clrMapOvr>
+    <a:masterClrMapping/>
+  </p:clrMapOvr>
+  <p:timing>
+    <p:tnLst>
+      <p:par>
+        <p:cTn id="1" dur="indefinite" restart="never" nodeType="tmRoot"/>
+      </p:par>
+    </p:tnLst>
+  </p:timing>
+</p:sld>
+</file>
+
+<file path=ppt/slides/slide14.xml><?xml version="1.0" encoding="utf-8"?>
+<p:sld xmlns:a="http://schemas.openxmlformats.org/drawingml/2006/main" xmlns:r="http://schemas.openxmlformats.org/officeDocument/2006/relationships" xmlns:p="http://schemas.openxmlformats.org/presentationml/2006/main">
+  <p:cSld>
+    <p:spTree>
+      <p:nvGrpSpPr>
+        <p:cNvPr id="1" name=""/>
+        <p:cNvGrpSpPr/>
+        <p:nvPr/>
+      </p:nvGrpSpPr>
+      <p:grpSpPr>
+        <a:xfrm>
+          <a:off x="0" y="0"/>
+          <a:ext cx="0" cy="0"/>
+          <a:chOff x="0" y="0"/>
+          <a:chExt cx="0" cy="0"/>
+        </a:xfrm>
+      </p:grpSpPr>
+      <p:sp>
+        <p:nvSpPr>
+          <p:cNvPr id="2" name="Título 1"/>
+          <p:cNvSpPr>
+            <a:spLocks noGrp="1"/>
+          </p:cNvSpPr>
+          <p:nvPr>
+            <p:ph type="title"/>
+          </p:nvPr>
+        </p:nvSpPr>
+        <p:spPr/>
+        <p:txBody>
+          <a:bodyPr/>
+          <a:lstStyle/>
+          <a:p>
+            <a:r>
+              <a:rPr lang="pt-BR" dirty="0" err="1" smtClean="0"/>
+              <a:t>Level</a:t>
+            </a:r>
+            <a:r>
+              <a:rPr lang="pt-BR" dirty="0" smtClean="0"/>
               <a:t> 5: </a:t>
             </a:r>
             <a:r>
@@ -3274,7 +4390,7 @@
 </p:sld>
 </file>
 
-<file path=ppt/slides/slide12.xml><?xml version="1.0" encoding="utf-8"?>
+<file path=ppt/slides/slide15.xml><?xml version="1.0" encoding="utf-8"?>
 <p:sld xmlns:a="http://schemas.openxmlformats.org/drawingml/2006/main" xmlns:r="http://schemas.openxmlformats.org/officeDocument/2006/relationships" xmlns:p="http://schemas.openxmlformats.org/presentationml/2006/main">
   <p:cSld>
     <p:spTree>
@@ -4223,24 +5339,8 @@
           <a:lstStyle/>
           <a:p>
             <a:r>
-              <a:rPr lang="pt-BR" dirty="0" err="1" smtClean="0"/>
-              <a:t>Level</a:t>
-            </a:r>
-            <a:r>
-              <a:rPr lang="pt-BR" dirty="0" smtClean="0"/>
-              <a:t> 1: </a:t>
-            </a:r>
-            <a:r>
-              <a:rPr lang="pt-BR" dirty="0" err="1" smtClean="0"/>
-              <a:t>Getting</a:t>
-            </a:r>
-            <a:r>
-              <a:rPr lang="pt-BR" dirty="0" smtClean="0"/>
-              <a:t> </a:t>
-            </a:r>
-            <a:r>
-              <a:rPr lang="pt-BR" dirty="0" err="1" smtClean="0"/>
-              <a:t>started</a:t>
+              <a:rPr lang="pt-BR" dirty="0" smtClean="0"/>
+              <a:t>Outros requisitos de aplicações web modernas</a:t>
             </a:r>
             <a:endParaRPr lang="pt-BR" dirty="0"/>
           </a:p>
@@ -4253,283 +5353,54 @@
             <a:spLocks noGrp="1"/>
           </p:cNvSpPr>
           <p:nvPr>
-            <p:ph sz="half" idx="1"/>
-          </p:nvPr>
-        </p:nvSpPr>
-        <p:spPr/>
-        <p:txBody>
-          <a:bodyPr>
-            <a:normAutofit fontScale="77500" lnSpcReduction="20000"/>
-          </a:bodyPr>
-          <a:lstStyle/>
-          <a:p>
-            <a:r>
-              <a:rPr lang="pt-BR" dirty="0" err="1" smtClean="0"/>
-              <a:t>What</a:t>
-            </a:r>
-            <a:r>
-              <a:rPr lang="pt-BR" dirty="0" smtClean="0"/>
-              <a:t> </a:t>
-            </a:r>
-            <a:r>
-              <a:rPr lang="pt-BR" dirty="0" err="1" smtClean="0"/>
-              <a:t>you</a:t>
-            </a:r>
-            <a:r>
-              <a:rPr lang="pt-BR" dirty="0" smtClean="0"/>
-              <a:t> </a:t>
-            </a:r>
-            <a:r>
-              <a:rPr lang="pt-BR" dirty="0" err="1" smtClean="0"/>
-              <a:t>need</a:t>
-            </a:r>
-            <a:r>
-              <a:rPr lang="pt-BR" dirty="0" smtClean="0"/>
-              <a:t> </a:t>
-            </a:r>
-            <a:r>
-              <a:rPr lang="pt-BR" dirty="0" err="1" smtClean="0"/>
-              <a:t>to</a:t>
-            </a:r>
-            <a:r>
-              <a:rPr lang="pt-BR" dirty="0" smtClean="0"/>
-              <a:t> </a:t>
-            </a:r>
-            <a:r>
-              <a:rPr lang="pt-BR" dirty="0" err="1" smtClean="0"/>
-              <a:t>know</a:t>
+            <p:ph idx="1"/>
+          </p:nvPr>
+        </p:nvSpPr>
+        <p:spPr/>
+        <p:txBody>
+          <a:bodyPr/>
+          <a:lstStyle/>
+          <a:p>
+            <a:r>
+              <a:rPr lang="pt-BR" dirty="0" smtClean="0"/>
+              <a:t>Software baseado em serviços e </a:t>
+            </a:r>
+            <a:r>
+              <a:rPr lang="pt-BR" dirty="0" err="1" smtClean="0"/>
+              <a:t>APIs</a:t>
             </a:r>
             <a:endParaRPr lang="pt-BR" dirty="0" smtClean="0"/>
           </a:p>
           <a:p>
             <a:r>
-              <a:rPr lang="pt-BR" dirty="0" err="1" smtClean="0"/>
-              <a:t>Why</a:t>
-            </a:r>
-            <a:r>
-              <a:rPr lang="pt-BR" dirty="0" smtClean="0"/>
-              <a:t> Angular?</a:t>
-            </a:r>
-          </a:p>
-          <a:p>
-            <a:r>
-              <a:rPr lang="pt-BR" dirty="0" err="1" smtClean="0"/>
-              <a:t>Traditional</a:t>
-            </a:r>
-            <a:r>
-              <a:rPr lang="pt-BR" dirty="0" smtClean="0"/>
-              <a:t> Page-</a:t>
-            </a:r>
-            <a:r>
-              <a:rPr lang="pt-BR" dirty="0" err="1" smtClean="0"/>
-              <a:t>refresh</a:t>
-            </a:r>
-            <a:endParaRPr lang="pt-BR" dirty="0" smtClean="0"/>
-          </a:p>
-          <a:p>
-            <a:r>
-              <a:rPr lang="pt-BR" dirty="0" err="1" smtClean="0"/>
-              <a:t>Responsive</a:t>
-            </a:r>
-            <a:r>
-              <a:rPr lang="pt-BR" baseline="0" dirty="0" smtClean="0"/>
-              <a:t> website </a:t>
-            </a:r>
-            <a:r>
-              <a:rPr lang="pt-BR" baseline="0" dirty="0" err="1" smtClean="0"/>
-              <a:t>using</a:t>
-            </a:r>
-            <a:r>
-              <a:rPr lang="pt-BR" baseline="0" dirty="0" smtClean="0"/>
-              <a:t> Angular</a:t>
-            </a:r>
-          </a:p>
-          <a:p>
-            <a:r>
-              <a:rPr lang="pt-BR" baseline="0" dirty="0" err="1" smtClean="0"/>
-              <a:t>Modern</a:t>
-            </a:r>
-            <a:r>
-              <a:rPr lang="pt-BR" baseline="0" dirty="0" smtClean="0"/>
-              <a:t> API-</a:t>
-            </a:r>
-            <a:r>
-              <a:rPr lang="pt-BR" baseline="0" dirty="0" err="1" smtClean="0"/>
-              <a:t>Driven</a:t>
-            </a:r>
-            <a:r>
-              <a:rPr lang="pt-BR" baseline="0" dirty="0" smtClean="0"/>
-              <a:t> </a:t>
-            </a:r>
-            <a:r>
-              <a:rPr lang="pt-BR" baseline="0" dirty="0" err="1" smtClean="0"/>
-              <a:t>Application</a:t>
-            </a:r>
-            <a:endParaRPr lang="pt-BR" baseline="0" dirty="0" smtClean="0"/>
-          </a:p>
-          <a:p>
-            <a:r>
-              <a:rPr lang="pt-BR" baseline="0" dirty="0" err="1" smtClean="0"/>
-              <a:t>What</a:t>
-            </a:r>
-            <a:r>
-              <a:rPr lang="pt-BR" baseline="0" dirty="0" smtClean="0"/>
-              <a:t> </a:t>
-            </a:r>
-            <a:r>
-              <a:rPr lang="pt-BR" baseline="0" dirty="0" err="1" smtClean="0"/>
-              <a:t>is</a:t>
-            </a:r>
-            <a:r>
-              <a:rPr lang="pt-BR" baseline="0" dirty="0" smtClean="0"/>
-              <a:t> Angular JS?</a:t>
-            </a:r>
-          </a:p>
-          <a:p>
-            <a:r>
-              <a:rPr lang="pt-BR" baseline="0" dirty="0" err="1" smtClean="0"/>
-              <a:t>Directives</a:t>
-            </a:r>
-            <a:endParaRPr lang="pt-BR" baseline="0" dirty="0" smtClean="0"/>
-          </a:p>
-          <a:p>
-            <a:r>
-              <a:rPr lang="pt-BR" baseline="0" dirty="0" err="1" smtClean="0"/>
-              <a:t>Downloading</a:t>
-            </a:r>
-            <a:endParaRPr lang="pt-BR" baseline="0" dirty="0" smtClean="0"/>
-          </a:p>
-          <a:p>
-            <a:r>
-              <a:rPr lang="pt-BR" baseline="0" dirty="0" smtClean="0"/>
-              <a:t>Modules</a:t>
-            </a:r>
-          </a:p>
-          <a:p>
-            <a:r>
-              <a:rPr lang="pt-BR" baseline="0" dirty="0" err="1" smtClean="0"/>
-              <a:t>Expressions</a:t>
-            </a:r>
-            <a:endParaRPr lang="pt-BR" baseline="0" dirty="0" smtClean="0"/>
-          </a:p>
-          <a:p>
-            <a:r>
-              <a:rPr lang="pt-BR" baseline="0" dirty="0" err="1" smtClean="0"/>
-              <a:t>Working</a:t>
-            </a:r>
-            <a:r>
-              <a:rPr lang="pt-BR" baseline="0" dirty="0" smtClean="0"/>
-              <a:t> </a:t>
-            </a:r>
-            <a:r>
-              <a:rPr lang="pt-BR" baseline="0" dirty="0" err="1" smtClean="0"/>
-              <a:t>with</a:t>
-            </a:r>
-            <a:r>
-              <a:rPr lang="pt-BR" baseline="0" dirty="0" smtClean="0"/>
-              <a:t> Data</a:t>
-            </a:r>
-          </a:p>
-          <a:p>
-            <a:r>
-              <a:rPr lang="pt-BR" dirty="0" err="1" smtClean="0"/>
-              <a:t>Controllers</a:t>
-            </a:r>
-            <a:endParaRPr lang="pt-BR" dirty="0" smtClean="0"/>
-          </a:p>
-        </p:txBody>
-      </p:sp>
-      <p:sp>
-        <p:nvSpPr>
-          <p:cNvPr id="4" name="Espaço Reservado para Conteúdo 3"/>
-          <p:cNvSpPr>
-            <a:spLocks noGrp="1"/>
-          </p:cNvSpPr>
-          <p:nvPr>
-            <p:ph sz="half" idx="2"/>
-          </p:nvPr>
-        </p:nvSpPr>
-        <p:spPr/>
-        <p:txBody>
-          <a:bodyPr>
-            <a:normAutofit fontScale="77500" lnSpcReduction="20000"/>
-          </a:bodyPr>
-          <a:lstStyle/>
-          <a:p>
-            <a:r>
-              <a:rPr lang="pt-BR" dirty="0" err="1" smtClean="0"/>
-              <a:t>Views</a:t>
-            </a:r>
-            <a:endParaRPr lang="pt-BR" dirty="0" smtClean="0"/>
-          </a:p>
-          <a:p>
-            <a:r>
-              <a:rPr lang="pt-BR" dirty="0" err="1" smtClean="0"/>
-              <a:t>Scope</a:t>
-            </a:r>
-            <a:endParaRPr lang="pt-BR" dirty="0" smtClean="0"/>
-          </a:p>
-          <a:p>
-            <a:r>
-              <a:rPr lang="pt-BR" dirty="0" err="1" smtClean="0"/>
-              <a:t>ng</a:t>
-            </a:r>
-            <a:r>
-              <a:rPr lang="pt-BR" dirty="0" smtClean="0"/>
-              <a:t>-show </a:t>
-            </a:r>
-            <a:r>
-              <a:rPr lang="pt-BR" dirty="0" err="1" smtClean="0"/>
-              <a:t>Directive</a:t>
-            </a:r>
-            <a:endParaRPr lang="pt-BR" dirty="0" smtClean="0"/>
-          </a:p>
-          <a:p>
-            <a:r>
-              <a:rPr lang="pt-BR" dirty="0" err="1" smtClean="0"/>
-              <a:t>ng-hide</a:t>
-            </a:r>
-            <a:r>
-              <a:rPr lang="pt-BR" dirty="0" smtClean="0"/>
-              <a:t> </a:t>
-            </a:r>
-            <a:r>
-              <a:rPr lang="pt-BR" dirty="0" err="1" smtClean="0"/>
-              <a:t>Directive</a:t>
-            </a:r>
-            <a:endParaRPr lang="pt-BR" dirty="0" smtClean="0"/>
-          </a:p>
-          <a:p>
-            <a:r>
-              <a:rPr lang="pt-BR" dirty="0" err="1" smtClean="0"/>
-              <a:t>ng-repeat</a:t>
-            </a:r>
-            <a:r>
-              <a:rPr lang="pt-BR" dirty="0" smtClean="0"/>
-              <a:t> </a:t>
-            </a:r>
-            <a:r>
-              <a:rPr lang="pt-BR" dirty="0" err="1" smtClean="0"/>
-              <a:t>Directive</a:t>
-            </a:r>
-            <a:endParaRPr lang="pt-BR" dirty="0" smtClean="0"/>
-          </a:p>
-          <a:p>
-            <a:r>
-              <a:rPr lang="pt-BR" dirty="0" smtClean="0"/>
-              <a:t>*</a:t>
-            </a:r>
-            <a:r>
-              <a:rPr lang="pt-BR" dirty="0" err="1" smtClean="0"/>
-              <a:t>Two-way</a:t>
-            </a:r>
-            <a:r>
-              <a:rPr lang="pt-BR" baseline="0" dirty="0" smtClean="0"/>
-              <a:t> data </a:t>
-            </a:r>
-            <a:r>
-              <a:rPr lang="pt-BR" baseline="0" dirty="0" err="1" smtClean="0"/>
-              <a:t>binding</a:t>
+              <a:rPr lang="pt-BR" dirty="0" smtClean="0"/>
+              <a:t>Comunicação com outros tipos de dispositivos</a:t>
+            </a:r>
+          </a:p>
+          <a:p>
+            <a:r>
+              <a:rPr lang="pt-BR" dirty="0" smtClean="0"/>
+              <a:t>Internet das coisas</a:t>
+            </a:r>
+          </a:p>
+          <a:p>
+            <a:r>
+              <a:rPr lang="pt-BR" dirty="0" smtClean="0"/>
+              <a:t>Software com Foco no front-</a:t>
+            </a:r>
+            <a:r>
+              <a:rPr lang="pt-BR" dirty="0" err="1" smtClean="0"/>
+              <a:t>end</a:t>
+            </a:r>
+            <a:r>
+              <a:rPr lang="pt-BR" dirty="0" smtClean="0"/>
+              <a:t> (e na experiência do usuário)</a:t>
+            </a:r>
+          </a:p>
+          <a:p>
+            <a:r>
+              <a:rPr lang="pt-BR" dirty="0" smtClean="0"/>
+              <a:t>Menor tempo de resposta (por isso o “responsivo” anterior)</a:t>
             </a:r>
             <a:endParaRPr lang="pt-BR" dirty="0"/>
           </a:p>
@@ -4538,7 +5409,7 @@
     </p:spTree>
     <p:extLst>
       <p:ext uri="{BB962C8B-B14F-4D97-AF65-F5344CB8AC3E}">
-        <p14:creationId xmlns:p14="http://schemas.microsoft.com/office/powerpoint/2010/main" val="4041649749"/>
+        <p14:creationId xmlns:p14="http://schemas.microsoft.com/office/powerpoint/2010/main" val="2756725839"/>
       </p:ext>
     </p:extLst>
   </p:cSld>
@@ -4589,43 +5460,11 @@
           <a:p>
             <a:r>
               <a:rPr lang="pt-BR" dirty="0" err="1" smtClean="0"/>
-              <a:t>Level</a:t>
-            </a:r>
-            <a:r>
-              <a:rPr lang="pt-BR" dirty="0" smtClean="0"/>
-              <a:t> 2: </a:t>
-            </a:r>
-            <a:r>
-              <a:rPr lang="pt-BR" dirty="0" err="1" smtClean="0"/>
-              <a:t>Filters</a:t>
-            </a:r>
-            <a:r>
-              <a:rPr lang="pt-BR" dirty="0" smtClean="0"/>
-              <a:t>, </a:t>
-            </a:r>
-            <a:r>
-              <a:rPr lang="pt-BR" dirty="0" err="1" smtClean="0"/>
-              <a:t>Directives</a:t>
-            </a:r>
-            <a:r>
-              <a:rPr lang="pt-BR" dirty="0" smtClean="0"/>
-              <a:t>,</a:t>
-            </a:r>
-            <a:r>
-              <a:rPr lang="pt-BR" baseline="0" dirty="0" smtClean="0"/>
-              <a:t> </a:t>
-            </a:r>
-            <a:r>
-              <a:rPr lang="pt-BR" baseline="0" dirty="0" err="1" smtClean="0"/>
-              <a:t>Cleaner</a:t>
-            </a:r>
-            <a:r>
-              <a:rPr lang="pt-BR" baseline="0" dirty="0" smtClean="0"/>
-              <a:t> </a:t>
-            </a:r>
-            <a:r>
-              <a:rPr lang="pt-BR" baseline="0" dirty="0" err="1" smtClean="0"/>
-              <a:t>Code</a:t>
+              <a:t>AngularJS</a:t>
+            </a:r>
+            <a:r>
+              <a:rPr lang="pt-BR" dirty="0" smtClean="0"/>
+              <a:t>: uma visão geral</a:t>
             </a:r>
             <a:endParaRPr lang="pt-BR" dirty="0"/>
           </a:p>
@@ -4633,497 +5472,128 @@
       </p:sp>
       <p:sp>
         <p:nvSpPr>
+          <p:cNvPr id="3" name="Espaço Reservado para Conteúdo 2"/>
+          <p:cNvSpPr>
+            <a:spLocks noGrp="1"/>
+          </p:cNvSpPr>
+          <p:nvPr>
+            <p:ph sz="half" idx="1"/>
+          </p:nvPr>
+        </p:nvSpPr>
+        <p:spPr/>
+        <p:txBody>
+          <a:bodyPr/>
+          <a:lstStyle/>
+          <a:p>
+            <a:r>
+              <a:rPr lang="pt-BR" dirty="0" err="1" smtClean="0"/>
+              <a:t>Template</a:t>
+            </a:r>
+            <a:endParaRPr lang="pt-BR" dirty="0" smtClean="0"/>
+          </a:p>
+          <a:p>
+            <a:r>
+              <a:rPr lang="pt-BR" dirty="0" smtClean="0"/>
+              <a:t>Diretiva</a:t>
+            </a:r>
+          </a:p>
+          <a:p>
+            <a:r>
+              <a:rPr lang="pt-BR" dirty="0" err="1" smtClean="0"/>
+              <a:t>Model</a:t>
+            </a:r>
+            <a:endParaRPr lang="pt-BR" dirty="0" smtClean="0"/>
+          </a:p>
+          <a:p>
+            <a:r>
+              <a:rPr lang="pt-BR" dirty="0" err="1" smtClean="0"/>
+              <a:t>Scopo</a:t>
+            </a:r>
+            <a:endParaRPr lang="pt-BR" dirty="0" smtClean="0"/>
+          </a:p>
+          <a:p>
+            <a:r>
+              <a:rPr lang="pt-BR" dirty="0" smtClean="0"/>
+              <a:t>Expressões</a:t>
+            </a:r>
+          </a:p>
+          <a:p>
+            <a:r>
+              <a:rPr lang="pt-BR" dirty="0" smtClean="0"/>
+              <a:t>Compilador</a:t>
+            </a:r>
+          </a:p>
+          <a:p>
+            <a:r>
+              <a:rPr lang="pt-BR" dirty="0" smtClean="0"/>
+              <a:t>Filtro</a:t>
+            </a:r>
+          </a:p>
+          <a:p>
+            <a:r>
+              <a:rPr lang="pt-BR" dirty="0" err="1" smtClean="0"/>
+              <a:t>View</a:t>
+            </a:r>
+            <a:endParaRPr lang="pt-BR" dirty="0"/>
+          </a:p>
+        </p:txBody>
+      </p:sp>
+      <p:sp>
+        <p:nvSpPr>
           <p:cNvPr id="4" name="Espaço Reservado para Conteúdo 3"/>
           <p:cNvSpPr>
             <a:spLocks noGrp="1"/>
           </p:cNvSpPr>
           <p:nvPr>
-            <p:ph sz="half" idx="1"/>
-          </p:nvPr>
-        </p:nvSpPr>
-        <p:spPr/>
-        <p:txBody>
-          <a:bodyPr>
-            <a:normAutofit/>
-          </a:bodyPr>
-          <a:lstStyle/>
-          <a:p>
-            <a:r>
-              <a:rPr lang="pt-BR" dirty="0" err="1" smtClean="0"/>
-              <a:t>Main</a:t>
-            </a:r>
-            <a:r>
-              <a:rPr lang="pt-BR" dirty="0" smtClean="0"/>
-              <a:t>,</a:t>
-            </a:r>
-            <a:r>
-              <a:rPr lang="pt-BR" baseline="0" dirty="0" smtClean="0"/>
-              <a:t> </a:t>
-            </a:r>
-            <a:r>
-              <a:rPr lang="pt-BR" baseline="0" dirty="0" err="1" smtClean="0"/>
-              <a:t>favorite</a:t>
-            </a:r>
-            <a:r>
-              <a:rPr lang="pt-BR" baseline="0" dirty="0" smtClean="0"/>
-              <a:t> </a:t>
-            </a:r>
-            <a:r>
-              <a:rPr lang="pt-BR" baseline="0" dirty="0" err="1" smtClean="0"/>
-              <a:t>Directives</a:t>
-            </a:r>
-            <a:endParaRPr lang="pt-BR" baseline="0" dirty="0" smtClean="0"/>
-          </a:p>
-          <a:p>
-            <a:pPr lvl="1"/>
-            <a:r>
-              <a:rPr lang="pt-BR" dirty="0" err="1" smtClean="0"/>
-              <a:t>ng-app</a:t>
+            <p:ph sz="half" idx="2"/>
+          </p:nvPr>
+        </p:nvSpPr>
+        <p:spPr/>
+        <p:txBody>
+          <a:bodyPr/>
+          <a:lstStyle/>
+          <a:p>
+            <a:r>
+              <a:rPr lang="pt-BR" dirty="0" smtClean="0"/>
+              <a:t>Data </a:t>
+            </a:r>
+            <a:r>
+              <a:rPr lang="pt-BR" dirty="0" err="1" smtClean="0"/>
+              <a:t>binding</a:t>
             </a:r>
             <a:endParaRPr lang="pt-BR" dirty="0" smtClean="0"/>
           </a:p>
           <a:p>
-            <a:pPr lvl="1"/>
-            <a:r>
-              <a:rPr lang="pt-BR" dirty="0" err="1" smtClean="0"/>
-              <a:t>ng-controller</a:t>
-            </a:r>
-            <a:endParaRPr lang="pt-BR" dirty="0" smtClean="0"/>
-          </a:p>
-          <a:p>
-            <a:r>
-              <a:rPr lang="pt-BR" dirty="0" err="1" smtClean="0"/>
-              <a:t>Filters</a:t>
-            </a:r>
-            <a:endParaRPr lang="pt-BR" dirty="0" smtClean="0"/>
-          </a:p>
-          <a:p>
-            <a:pPr lvl="1"/>
-            <a:r>
-              <a:rPr lang="pt-BR" dirty="0" err="1" smtClean="0"/>
-              <a:t>currency</a:t>
-            </a:r>
-            <a:endParaRPr lang="pt-BR" dirty="0" smtClean="0"/>
-          </a:p>
-          <a:p>
-            <a:pPr lvl="1"/>
-            <a:r>
-              <a:rPr lang="pt-BR" dirty="0" smtClean="0"/>
-              <a:t>date</a:t>
-            </a:r>
-          </a:p>
-          <a:p>
-            <a:pPr lvl="1"/>
-            <a:r>
-              <a:rPr lang="pt-BR" dirty="0" err="1" smtClean="0"/>
-              <a:t>uppercase</a:t>
-            </a:r>
-            <a:r>
-              <a:rPr lang="pt-BR" dirty="0" smtClean="0"/>
-              <a:t> </a:t>
-            </a:r>
-          </a:p>
-          <a:p>
-            <a:pPr lvl="1"/>
-            <a:r>
-              <a:rPr lang="pt-BR" dirty="0" err="1" smtClean="0"/>
-              <a:t>limitTo</a:t>
-            </a:r>
-            <a:r>
-              <a:rPr lang="pt-BR" dirty="0" smtClean="0"/>
-              <a:t> </a:t>
-            </a:r>
-          </a:p>
-          <a:p>
-            <a:pPr lvl="1"/>
-            <a:r>
-              <a:rPr lang="pt-BR" dirty="0" err="1" smtClean="0"/>
-              <a:t>orderBy</a:t>
-            </a:r>
-            <a:r>
-              <a:rPr lang="pt-BR" dirty="0" smtClean="0"/>
-              <a:t> </a:t>
+            <a:r>
+              <a:rPr lang="pt-BR" dirty="0" smtClean="0"/>
+              <a:t>Injeção de Dependência (DI)</a:t>
+            </a:r>
+          </a:p>
+          <a:p>
+            <a:r>
+              <a:rPr lang="pt-BR" dirty="0" smtClean="0"/>
+              <a:t>Injetor</a:t>
+            </a:r>
+          </a:p>
+          <a:p>
+            <a:r>
+              <a:rPr lang="pt-BR" dirty="0" smtClean="0"/>
+              <a:t>Módulo</a:t>
+            </a:r>
+          </a:p>
+          <a:p>
+            <a:r>
+              <a:rPr lang="pt-BR" dirty="0" smtClean="0"/>
+              <a:t>Serviço</a:t>
             </a:r>
             <a:endParaRPr lang="pt-BR" dirty="0"/>
-          </a:p>
-        </p:txBody>
-      </p:sp>
-      <p:sp>
-        <p:nvSpPr>
-          <p:cNvPr id="5" name="Espaço Reservado para Conteúdo 4"/>
-          <p:cNvSpPr>
-            <a:spLocks noGrp="1"/>
-          </p:cNvSpPr>
-          <p:nvPr>
-            <p:ph sz="half" idx="2"/>
-          </p:nvPr>
-        </p:nvSpPr>
-        <p:spPr/>
-        <p:txBody>
-          <a:bodyPr>
-            <a:normAutofit/>
-          </a:bodyPr>
-          <a:lstStyle/>
-          <a:p>
-            <a:pPr rtl="0" eaLnBrk="1" latinLnBrk="0" hangingPunct="1"/>
-            <a:r>
-              <a:rPr lang="pt-BR" sz="2800" kern="1200" dirty="0" err="1" smtClean="0">
-                <a:solidFill>
-                  <a:schemeClr val="tx1"/>
-                </a:solidFill>
-                <a:effectLst/>
-                <a:latin typeface="+mn-lt"/>
-                <a:ea typeface="+mn-ea"/>
-                <a:cs typeface="+mn-cs"/>
-              </a:rPr>
-              <a:t>ng-src</a:t>
-            </a:r>
-            <a:r>
-              <a:rPr lang="pt-BR" sz="2800" kern="1200" dirty="0" smtClean="0">
-                <a:solidFill>
-                  <a:schemeClr val="tx1"/>
-                </a:solidFill>
-                <a:effectLst/>
-                <a:latin typeface="+mn-lt"/>
-                <a:ea typeface="+mn-ea"/>
-                <a:cs typeface="+mn-cs"/>
-              </a:rPr>
-              <a:t> </a:t>
-            </a:r>
-            <a:r>
-              <a:rPr lang="pt-BR" sz="2800" kern="1200" dirty="0" err="1" smtClean="0">
-                <a:solidFill>
-                  <a:schemeClr val="tx1"/>
-                </a:solidFill>
-                <a:effectLst/>
-                <a:latin typeface="+mn-lt"/>
-                <a:ea typeface="+mn-ea"/>
-                <a:cs typeface="+mn-cs"/>
-              </a:rPr>
-              <a:t>Directive</a:t>
-            </a:r>
-            <a:endParaRPr lang="pt-BR" sz="2800" dirty="0" smtClean="0">
-              <a:effectLst/>
-            </a:endParaRPr>
-          </a:p>
-          <a:p>
-            <a:pPr rtl="0" eaLnBrk="1" latinLnBrk="0" hangingPunct="1"/>
-            <a:r>
-              <a:rPr lang="pt-BR" sz="2800" kern="1200" dirty="0" err="1" smtClean="0">
-                <a:solidFill>
-                  <a:schemeClr val="tx1"/>
-                </a:solidFill>
-                <a:effectLst/>
-                <a:latin typeface="+mn-lt"/>
-                <a:ea typeface="+mn-ea"/>
-                <a:cs typeface="+mn-cs"/>
-              </a:rPr>
-              <a:t>ng</a:t>
-            </a:r>
-            <a:r>
-              <a:rPr lang="pt-BR" sz="2800" kern="1200" dirty="0" smtClean="0">
-                <a:solidFill>
-                  <a:schemeClr val="tx1"/>
-                </a:solidFill>
-                <a:effectLst/>
-                <a:latin typeface="+mn-lt"/>
-                <a:ea typeface="+mn-ea"/>
-                <a:cs typeface="+mn-cs"/>
-              </a:rPr>
-              <a:t>-click </a:t>
-            </a:r>
-            <a:r>
-              <a:rPr lang="pt-BR" sz="2800" kern="1200" dirty="0" err="1" smtClean="0">
-                <a:solidFill>
-                  <a:schemeClr val="tx1"/>
-                </a:solidFill>
-                <a:effectLst/>
-                <a:latin typeface="+mn-lt"/>
-                <a:ea typeface="+mn-ea"/>
-                <a:cs typeface="+mn-cs"/>
-              </a:rPr>
-              <a:t>Directive</a:t>
-            </a:r>
-            <a:endParaRPr lang="pt-BR" dirty="0" smtClean="0">
-              <a:effectLst/>
-            </a:endParaRPr>
-          </a:p>
-          <a:p>
-            <a:pPr rtl="0" eaLnBrk="1" latinLnBrk="0" hangingPunct="1"/>
-            <a:r>
-              <a:rPr lang="pt-BR" sz="2800" kern="1200" dirty="0" err="1" smtClean="0">
-                <a:solidFill>
-                  <a:schemeClr val="tx1"/>
-                </a:solidFill>
-                <a:effectLst/>
-                <a:latin typeface="+mn-lt"/>
-                <a:ea typeface="+mn-ea"/>
-                <a:cs typeface="+mn-cs"/>
-              </a:rPr>
-              <a:t>ng-init</a:t>
-            </a:r>
-            <a:r>
-              <a:rPr lang="pt-BR" sz="2800" kern="1200" dirty="0" smtClean="0">
-                <a:solidFill>
-                  <a:schemeClr val="tx1"/>
-                </a:solidFill>
-                <a:effectLst/>
-                <a:latin typeface="+mn-lt"/>
-                <a:ea typeface="+mn-ea"/>
-                <a:cs typeface="+mn-cs"/>
-              </a:rPr>
-              <a:t> </a:t>
-            </a:r>
-            <a:r>
-              <a:rPr lang="pt-BR" sz="2800" kern="1200" dirty="0" err="1" smtClean="0">
-                <a:solidFill>
-                  <a:schemeClr val="tx1"/>
-                </a:solidFill>
-                <a:effectLst/>
-                <a:latin typeface="+mn-lt"/>
-                <a:ea typeface="+mn-ea"/>
-                <a:cs typeface="+mn-cs"/>
-              </a:rPr>
-              <a:t>Directive</a:t>
-            </a:r>
-            <a:endParaRPr lang="pt-BR" dirty="0" smtClean="0">
-              <a:effectLst/>
-            </a:endParaRPr>
-          </a:p>
-          <a:p>
-            <a:pPr rtl="0" eaLnBrk="1" latinLnBrk="0" hangingPunct="1"/>
-            <a:r>
-              <a:rPr lang="pt-BR" sz="2800" kern="1200" dirty="0" err="1" smtClean="0">
-                <a:solidFill>
-                  <a:schemeClr val="tx1"/>
-                </a:solidFill>
-                <a:effectLst/>
-                <a:latin typeface="+mn-lt"/>
-                <a:ea typeface="+mn-ea"/>
-                <a:cs typeface="+mn-cs"/>
-              </a:rPr>
-              <a:t>ng-class</a:t>
-            </a:r>
-            <a:r>
-              <a:rPr lang="pt-BR" sz="2800" kern="1200" dirty="0" smtClean="0">
-                <a:solidFill>
-                  <a:schemeClr val="tx1"/>
-                </a:solidFill>
-                <a:effectLst/>
-                <a:latin typeface="+mn-lt"/>
-                <a:ea typeface="+mn-ea"/>
-                <a:cs typeface="+mn-cs"/>
-              </a:rPr>
-              <a:t> </a:t>
-            </a:r>
-            <a:r>
-              <a:rPr lang="pt-BR" sz="2800" kern="1200" dirty="0" err="1" smtClean="0">
-                <a:solidFill>
-                  <a:schemeClr val="tx1"/>
-                </a:solidFill>
-                <a:effectLst/>
-                <a:latin typeface="+mn-lt"/>
-                <a:ea typeface="+mn-ea"/>
-                <a:cs typeface="+mn-cs"/>
-              </a:rPr>
-              <a:t>Directive</a:t>
-            </a:r>
-            <a:endParaRPr lang="pt-BR" dirty="0" smtClean="0">
-              <a:effectLst/>
-            </a:endParaRPr>
-          </a:p>
-          <a:p>
-            <a:pPr rtl="0" eaLnBrk="1" latinLnBrk="0" hangingPunct="1"/>
-            <a:r>
-              <a:rPr lang="pt-BR" sz="2800" kern="1200" dirty="0" err="1" smtClean="0">
-                <a:solidFill>
-                  <a:schemeClr val="tx1"/>
-                </a:solidFill>
-                <a:effectLst/>
-                <a:latin typeface="+mn-lt"/>
-                <a:ea typeface="+mn-ea"/>
-                <a:cs typeface="+mn-cs"/>
-              </a:rPr>
-              <a:t>Cleaning</a:t>
-            </a:r>
-            <a:r>
-              <a:rPr lang="pt-BR" sz="2800" kern="1200" dirty="0" smtClean="0">
-                <a:solidFill>
-                  <a:schemeClr val="tx1"/>
-                </a:solidFill>
-                <a:effectLst/>
-                <a:latin typeface="+mn-lt"/>
-                <a:ea typeface="+mn-ea"/>
-                <a:cs typeface="+mn-cs"/>
-              </a:rPr>
-              <a:t> </a:t>
-            </a:r>
-            <a:r>
-              <a:rPr lang="pt-BR" sz="2800" kern="1200" dirty="0" err="1" smtClean="0">
-                <a:solidFill>
-                  <a:schemeClr val="tx1"/>
-                </a:solidFill>
-                <a:effectLst/>
-                <a:latin typeface="+mn-lt"/>
-                <a:ea typeface="+mn-ea"/>
-                <a:cs typeface="+mn-cs"/>
-              </a:rPr>
-              <a:t>code</a:t>
-            </a:r>
-            <a:r>
-              <a:rPr lang="pt-BR" sz="2800" kern="1200" dirty="0" smtClean="0">
-                <a:solidFill>
-                  <a:schemeClr val="tx1"/>
-                </a:solidFill>
-                <a:effectLst/>
-                <a:latin typeface="+mn-lt"/>
-                <a:ea typeface="+mn-ea"/>
-                <a:cs typeface="+mn-cs"/>
-              </a:rPr>
-              <a:t>: </a:t>
-            </a:r>
-            <a:r>
-              <a:rPr lang="pt-BR" sz="2800" kern="1200" dirty="0" err="1" smtClean="0">
-                <a:solidFill>
-                  <a:schemeClr val="tx1"/>
-                </a:solidFill>
-                <a:effectLst/>
-                <a:latin typeface="+mn-lt"/>
-                <a:ea typeface="+mn-ea"/>
-                <a:cs typeface="+mn-cs"/>
-              </a:rPr>
-              <a:t>moving</a:t>
-            </a:r>
-            <a:r>
-              <a:rPr lang="pt-BR" sz="2800" kern="1200" dirty="0" smtClean="0">
-                <a:solidFill>
-                  <a:schemeClr val="tx1"/>
-                </a:solidFill>
-                <a:effectLst/>
-                <a:latin typeface="+mn-lt"/>
-                <a:ea typeface="+mn-ea"/>
-                <a:cs typeface="+mn-cs"/>
-              </a:rPr>
-              <a:t> </a:t>
-            </a:r>
-            <a:r>
-              <a:rPr lang="pt-BR" sz="2800" kern="1200" dirty="0" err="1" smtClean="0">
-                <a:solidFill>
-                  <a:schemeClr val="tx1"/>
-                </a:solidFill>
-                <a:effectLst/>
-                <a:latin typeface="+mn-lt"/>
-                <a:ea typeface="+mn-ea"/>
-                <a:cs typeface="+mn-cs"/>
-              </a:rPr>
-              <a:t>code</a:t>
-            </a:r>
-            <a:r>
-              <a:rPr lang="pt-BR" sz="2800" kern="1200" dirty="0" smtClean="0">
-                <a:solidFill>
-                  <a:schemeClr val="tx1"/>
-                </a:solidFill>
-                <a:effectLst/>
-                <a:latin typeface="+mn-lt"/>
-                <a:ea typeface="+mn-ea"/>
-                <a:cs typeface="+mn-cs"/>
-              </a:rPr>
-              <a:t> </a:t>
-            </a:r>
-            <a:r>
-              <a:rPr lang="pt-BR" sz="2800" kern="1200" dirty="0" err="1" smtClean="0">
-                <a:solidFill>
-                  <a:schemeClr val="tx1"/>
-                </a:solidFill>
-                <a:effectLst/>
-                <a:latin typeface="+mn-lt"/>
-                <a:ea typeface="+mn-ea"/>
-                <a:cs typeface="+mn-cs"/>
-              </a:rPr>
-              <a:t>from</a:t>
-            </a:r>
-            <a:r>
-              <a:rPr lang="pt-BR" sz="2800" kern="1200" dirty="0" smtClean="0">
-                <a:solidFill>
-                  <a:schemeClr val="tx1"/>
-                </a:solidFill>
-                <a:effectLst/>
-                <a:latin typeface="+mn-lt"/>
-                <a:ea typeface="+mn-ea"/>
-                <a:cs typeface="+mn-cs"/>
-              </a:rPr>
-              <a:t> </a:t>
-            </a:r>
-            <a:r>
-              <a:rPr lang="pt-BR" sz="2800" kern="1200" dirty="0" err="1" smtClean="0">
-                <a:solidFill>
-                  <a:schemeClr val="tx1"/>
-                </a:solidFill>
-                <a:effectLst/>
-                <a:latin typeface="+mn-lt"/>
-                <a:ea typeface="+mn-ea"/>
-                <a:cs typeface="+mn-cs"/>
-              </a:rPr>
-              <a:t>view</a:t>
-            </a:r>
-            <a:r>
-              <a:rPr lang="pt-BR" sz="2800" kern="1200" dirty="0" smtClean="0">
-                <a:solidFill>
-                  <a:schemeClr val="tx1"/>
-                </a:solidFill>
-                <a:effectLst/>
-                <a:latin typeface="+mn-lt"/>
-                <a:ea typeface="+mn-ea"/>
-                <a:cs typeface="+mn-cs"/>
-              </a:rPr>
-              <a:t> </a:t>
-            </a:r>
-            <a:r>
-              <a:rPr lang="pt-BR" sz="2800" kern="1200" dirty="0" err="1" smtClean="0">
-                <a:solidFill>
-                  <a:schemeClr val="tx1"/>
-                </a:solidFill>
-                <a:effectLst/>
-                <a:latin typeface="+mn-lt"/>
-                <a:ea typeface="+mn-ea"/>
-                <a:cs typeface="+mn-cs"/>
-              </a:rPr>
-              <a:t>to</a:t>
-            </a:r>
-            <a:r>
-              <a:rPr lang="pt-BR" sz="2800" kern="1200" dirty="0" smtClean="0">
-                <a:solidFill>
-                  <a:schemeClr val="tx1"/>
-                </a:solidFill>
-                <a:effectLst/>
-                <a:latin typeface="+mn-lt"/>
-                <a:ea typeface="+mn-ea"/>
-                <a:cs typeface="+mn-cs"/>
-              </a:rPr>
-              <a:t> </a:t>
-            </a:r>
-            <a:r>
-              <a:rPr lang="pt-BR" sz="2800" kern="1200" dirty="0" err="1" smtClean="0">
-                <a:solidFill>
-                  <a:schemeClr val="tx1"/>
-                </a:solidFill>
-                <a:effectLst/>
-                <a:latin typeface="+mn-lt"/>
-                <a:ea typeface="+mn-ea"/>
-                <a:cs typeface="+mn-cs"/>
-              </a:rPr>
-              <a:t>controller</a:t>
-            </a:r>
-            <a:endParaRPr lang="pt-BR" dirty="0" smtClean="0">
-              <a:effectLst/>
-            </a:endParaRPr>
           </a:p>
         </p:txBody>
       </p:sp>
     </p:spTree>
     <p:extLst>
       <p:ext uri="{BB962C8B-B14F-4D97-AF65-F5344CB8AC3E}">
-        <p14:creationId xmlns:p14="http://schemas.microsoft.com/office/powerpoint/2010/main" val="4147979107"/>
+        <p14:creationId xmlns:p14="http://schemas.microsoft.com/office/powerpoint/2010/main" val="1169860122"/>
       </p:ext>
     </p:extLst>
   </p:cSld>
@@ -5159,7 +5629,7 @@
       </p:grpSpPr>
       <p:sp>
         <p:nvSpPr>
-          <p:cNvPr id="4" name="Título 3"/>
+          <p:cNvPr id="7" name="Título 6"/>
           <p:cNvSpPr>
             <a:spLocks noGrp="1"/>
           </p:cNvSpPr>
@@ -5173,32 +5643,8 @@
           <a:lstStyle/>
           <a:p>
             <a:r>
-              <a:rPr lang="pt-BR" dirty="0" err="1" smtClean="0"/>
-              <a:t>Level</a:t>
-            </a:r>
-            <a:r>
-              <a:rPr lang="pt-BR" dirty="0" smtClean="0"/>
-              <a:t> 3: </a:t>
-            </a:r>
-            <a:r>
-              <a:rPr lang="pt-BR" dirty="0" err="1" smtClean="0"/>
-              <a:t>Forms</a:t>
-            </a:r>
-            <a:r>
-              <a:rPr lang="pt-BR" dirty="0" smtClean="0"/>
-              <a:t>, </a:t>
-            </a:r>
-            <a:r>
-              <a:rPr lang="pt-BR" dirty="0" err="1" smtClean="0"/>
-              <a:t>Models</a:t>
-            </a:r>
-            <a:r>
-              <a:rPr lang="pt-BR" dirty="0" smtClean="0"/>
-              <a:t>, </a:t>
-            </a:r>
-            <a:r>
-              <a:rPr lang="pt-BR" dirty="0" err="1" smtClean="0"/>
-              <a:t>Validations</a:t>
+              <a:rPr lang="pt-BR" dirty="0" smtClean="0"/>
+              <a:t>Configurando o ambiente local</a:t>
             </a:r>
             <a:endParaRPr lang="pt-BR" dirty="0"/>
           </a:p>
@@ -5206,87 +5652,148 @@
       </p:sp>
       <p:sp>
         <p:nvSpPr>
-          <p:cNvPr id="5" name="Espaço Reservado para Conteúdo 4"/>
-          <p:cNvSpPr>
-            <a:spLocks noGrp="1"/>
-          </p:cNvSpPr>
-          <p:nvPr>
-            <p:ph sz="half" idx="1"/>
-          </p:nvPr>
-        </p:nvSpPr>
-        <p:spPr/>
-        <p:txBody>
-          <a:bodyPr/>
-          <a:lstStyle/>
-          <a:p>
-            <a:r>
-              <a:rPr lang="pt-BR" dirty="0" err="1" smtClean="0"/>
-              <a:t>ng-model</a:t>
+          <p:cNvPr id="8" name="Espaço Reservado para Conteúdo 7"/>
+          <p:cNvSpPr>
+            <a:spLocks noGrp="1"/>
+          </p:cNvSpPr>
+          <p:nvPr>
+            <p:ph idx="1"/>
+          </p:nvPr>
+        </p:nvSpPr>
+        <p:spPr/>
+        <p:txBody>
+          <a:bodyPr/>
+          <a:lstStyle/>
+          <a:p>
+            <a:r>
+              <a:rPr lang="pt-BR" dirty="0" smtClean="0"/>
+              <a:t>Que software é necessário para trabalhar com o Angular?</a:t>
+            </a:r>
+          </a:p>
+          <a:p>
+            <a:pPr lvl="1"/>
+            <a:r>
+              <a:rPr lang="pt-BR" dirty="0" smtClean="0"/>
+              <a:t>Editor de texto (sugestão: </a:t>
+            </a:r>
+            <a:r>
+              <a:rPr lang="pt-BR" dirty="0" err="1" smtClean="0"/>
+              <a:t>Notepad</a:t>
+            </a:r>
+            <a:r>
+              <a:rPr lang="pt-BR" dirty="0" smtClean="0"/>
+              <a:t>++, </a:t>
+            </a:r>
+            <a:r>
+              <a:rPr lang="pt-BR" dirty="0" err="1" smtClean="0"/>
+              <a:t>SublimeText</a:t>
+            </a:r>
+            <a:r>
+              <a:rPr lang="pt-BR" dirty="0" smtClean="0"/>
+              <a:t> ...)</a:t>
+            </a:r>
+          </a:p>
+          <a:p>
+            <a:r>
+              <a:rPr lang="pt-BR" dirty="0" smtClean="0"/>
+              <a:t>Download do </a:t>
+            </a:r>
+            <a:r>
+              <a:rPr lang="pt-BR" dirty="0" err="1" smtClean="0"/>
+              <a:t>AngularJS</a:t>
+            </a:r>
+            <a:endParaRPr lang="pt-BR" dirty="0" smtClean="0"/>
+          </a:p>
+          <a:p>
+            <a:pPr lvl="1"/>
+            <a:r>
+              <a:rPr lang="pt-BR" dirty="0" smtClean="0">
+                <a:hlinkClick r:id="rId2"/>
+              </a:rPr>
+              <a:t>http://angularjs.org</a:t>
             </a:r>
             <a:r>
               <a:rPr lang="pt-BR" dirty="0" smtClean="0"/>
               <a:t> </a:t>
             </a:r>
-            <a:r>
-              <a:rPr lang="pt-BR" dirty="0" err="1" smtClean="0"/>
-              <a:t>Directive</a:t>
+          </a:p>
+          <a:p>
+            <a:r>
+              <a:rPr lang="pt-BR" dirty="0" smtClean="0"/>
+              <a:t>Usar direto da CDN</a:t>
+            </a:r>
+          </a:p>
+          <a:p>
+            <a:pPr lvl="1"/>
+            <a:r>
+              <a:rPr lang="pt-BR" dirty="0">
+                <a:hlinkClick r:id="rId3"/>
+              </a:rPr>
+              <a:t>https://</a:t>
+            </a:r>
+            <a:r>
+              <a:rPr lang="pt-BR" dirty="0" smtClean="0">
+                <a:hlinkClick r:id="rId3"/>
+              </a:rPr>
+              <a:t>ajax.googleapis.com/ajax/libs/angularjs/1.3.0/angular.min.js</a:t>
+            </a:r>
+            <a:r>
+              <a:rPr lang="pt-BR" dirty="0" smtClean="0"/>
+              <a:t> </a:t>
+            </a:r>
+          </a:p>
+          <a:p>
+            <a:r>
+              <a:rPr lang="pt-BR" dirty="0" smtClean="0"/>
+              <a:t>Usar </a:t>
+            </a:r>
+            <a:r>
+              <a:rPr lang="pt-BR" dirty="0" err="1" smtClean="0"/>
+              <a:t>Bower</a:t>
             </a:r>
             <a:endParaRPr lang="pt-BR" dirty="0" smtClean="0"/>
           </a:p>
           <a:p>
-            <a:r>
-              <a:rPr lang="pt-BR" dirty="0" err="1" smtClean="0"/>
-              <a:t>ng-submit</a:t>
-            </a:r>
-            <a:r>
-              <a:rPr lang="pt-BR" dirty="0" smtClean="0"/>
+            <a:pPr lvl="1"/>
+            <a:r>
+              <a:rPr lang="pt-BR" dirty="0" err="1" smtClean="0">
+                <a:latin typeface="Consolas" panose="020B0609020204030204" pitchFamily="49" charset="0"/>
+                <a:cs typeface="Consolas" panose="020B0609020204030204" pitchFamily="49" charset="0"/>
+              </a:rPr>
+              <a:t>bower</a:t>
+            </a:r>
+            <a:r>
+              <a:rPr lang="pt-BR" dirty="0" smtClean="0">
+                <a:latin typeface="Consolas" panose="020B0609020204030204" pitchFamily="49" charset="0"/>
+                <a:cs typeface="Consolas" panose="020B0609020204030204" pitchFamily="49" charset="0"/>
+              </a:rPr>
               <a:t> </a:t>
             </a:r>
             <a:r>
-              <a:rPr lang="pt-BR" dirty="0" err="1" smtClean="0"/>
-              <a:t>Directive</a:t>
-            </a:r>
-            <a:endParaRPr lang="pt-BR" dirty="0" smtClean="0"/>
-          </a:p>
-          <a:p>
-            <a:r>
-              <a:rPr lang="pt-BR" dirty="0" smtClean="0"/>
-              <a:t>$</a:t>
-            </a:r>
-            <a:r>
-              <a:rPr lang="pt-BR" dirty="0" err="1" smtClean="0"/>
-              <a:t>valid</a:t>
-            </a:r>
-            <a:endParaRPr lang="pt-BR" dirty="0"/>
-          </a:p>
-        </p:txBody>
-      </p:sp>
-      <p:sp>
-        <p:nvSpPr>
-          <p:cNvPr id="6" name="Espaço Reservado para Conteúdo 5"/>
-          <p:cNvSpPr>
-            <a:spLocks noGrp="1"/>
-          </p:cNvSpPr>
-          <p:nvPr>
-            <p:ph sz="half" idx="2"/>
-          </p:nvPr>
-        </p:nvSpPr>
-        <p:spPr/>
-        <p:txBody>
-          <a:bodyPr/>
-          <a:lstStyle/>
-          <a:p>
-            <a:pPr marL="0" indent="0">
-              <a:buNone/>
-            </a:pPr>
-            <a:endParaRPr lang="pt-BR" dirty="0"/>
+              <a:rPr lang="pt-BR" dirty="0" err="1" smtClean="0">
+                <a:latin typeface="Consolas" panose="020B0609020204030204" pitchFamily="49" charset="0"/>
+                <a:cs typeface="Consolas" panose="020B0609020204030204" pitchFamily="49" charset="0"/>
+              </a:rPr>
+              <a:t>install</a:t>
+            </a:r>
+            <a:r>
+              <a:rPr lang="pt-BR" dirty="0" smtClean="0">
+                <a:latin typeface="Consolas" panose="020B0609020204030204" pitchFamily="49" charset="0"/>
+                <a:cs typeface="Consolas" panose="020B0609020204030204" pitchFamily="49" charset="0"/>
+              </a:rPr>
+              <a:t> angular#1.3.0</a:t>
+            </a:r>
+            <a:endParaRPr lang="pt-BR" dirty="0">
+              <a:latin typeface="Consolas" panose="020B0609020204030204" pitchFamily="49" charset="0"/>
+              <a:cs typeface="Consolas" panose="020B0609020204030204" pitchFamily="49" charset="0"/>
+            </a:endParaRPr>
           </a:p>
         </p:txBody>
       </p:sp>
     </p:spTree>
     <p:extLst>
       <p:ext uri="{BB962C8B-B14F-4D97-AF65-F5344CB8AC3E}">
-        <p14:creationId xmlns:p14="http://schemas.microsoft.com/office/powerpoint/2010/main" val="3933258382"/>
+        <p14:creationId xmlns:p14="http://schemas.microsoft.com/office/powerpoint/2010/main" val="2047893096"/>
       </p:ext>
     </p:extLst>
   </p:cSld>

</xml_diff>